<commit_message>
Update intro of eval section, and comparison systems figure
</commit_message>
<xml_diff>
--- a/yfcc100m/paper/figures/comparison_system.pptx
+++ b/yfcc100m/paper/figures/comparison_system.pptx
@@ -6,6 +6,7 @@
   </p:sldMasterIdLst>
   <p:sldIdLst>
     <p:sldId id="1464" r:id="rId2"/>
+    <p:sldId id="1465" r:id="rId3"/>
   </p:sldIdLst>
   <p:sldSz cx="7772400" cy="3657600"/>
   <p:notesSz cx="6858000" cy="9144000"/>
@@ -243,7 +244,7 @@
           <a:p>
             <a:fld id="{FC088DA2-E2B4-0147-A2CD-628931F110B8}" type="datetimeFigureOut">
               <a:rPr lang="en-US" smtClean="0"/>
-              <a:t>2/25/20</a:t>
+              <a:t>2/16/21</a:t>
             </a:fld>
             <a:endParaRPr lang="en-US"/>
           </a:p>
@@ -413,7 +414,7 @@
           <a:p>
             <a:fld id="{FC088DA2-E2B4-0147-A2CD-628931F110B8}" type="datetimeFigureOut">
               <a:rPr lang="en-US" smtClean="0"/>
-              <a:t>2/25/20</a:t>
+              <a:t>2/16/21</a:t>
             </a:fld>
             <a:endParaRPr lang="en-US"/>
           </a:p>
@@ -593,7 +594,7 @@
           <a:p>
             <a:fld id="{FC088DA2-E2B4-0147-A2CD-628931F110B8}" type="datetimeFigureOut">
               <a:rPr lang="en-US" smtClean="0"/>
-              <a:t>2/25/20</a:t>
+              <a:t>2/16/21</a:t>
             </a:fld>
             <a:endParaRPr lang="en-US"/>
           </a:p>
@@ -951,7 +952,7 @@
           <a:p>
             <a:fld id="{FC088DA2-E2B4-0147-A2CD-628931F110B8}" type="datetimeFigureOut">
               <a:rPr lang="en-US" smtClean="0"/>
-              <a:t>2/25/20</a:t>
+              <a:t>2/16/21</a:t>
             </a:fld>
             <a:endParaRPr lang="en-US"/>
           </a:p>
@@ -1197,7 +1198,7 @@
           <a:p>
             <a:fld id="{FC088DA2-E2B4-0147-A2CD-628931F110B8}" type="datetimeFigureOut">
               <a:rPr lang="en-US" smtClean="0"/>
-              <a:t>2/25/20</a:t>
+              <a:t>2/16/21</a:t>
             </a:fld>
             <a:endParaRPr lang="en-US"/>
           </a:p>
@@ -1429,7 +1430,7 @@
           <a:p>
             <a:fld id="{FC088DA2-E2B4-0147-A2CD-628931F110B8}" type="datetimeFigureOut">
               <a:rPr lang="en-US" smtClean="0"/>
-              <a:t>2/25/20</a:t>
+              <a:t>2/16/21</a:t>
             </a:fld>
             <a:endParaRPr lang="en-US"/>
           </a:p>
@@ -1796,7 +1797,7 @@
           <a:p>
             <a:fld id="{FC088DA2-E2B4-0147-A2CD-628931F110B8}" type="datetimeFigureOut">
               <a:rPr lang="en-US" smtClean="0"/>
-              <a:t>2/25/20</a:t>
+              <a:t>2/16/21</a:t>
             </a:fld>
             <a:endParaRPr lang="en-US"/>
           </a:p>
@@ -1914,7 +1915,7 @@
           <a:p>
             <a:fld id="{FC088DA2-E2B4-0147-A2CD-628931F110B8}" type="datetimeFigureOut">
               <a:rPr lang="en-US" smtClean="0"/>
-              <a:t>2/25/20</a:t>
+              <a:t>2/16/21</a:t>
             </a:fld>
             <a:endParaRPr lang="en-US"/>
           </a:p>
@@ -2009,7 +2010,7 @@
           <a:p>
             <a:fld id="{FC088DA2-E2B4-0147-A2CD-628931F110B8}" type="datetimeFigureOut">
               <a:rPr lang="en-US" smtClean="0"/>
-              <a:t>2/25/20</a:t>
+              <a:t>2/16/21</a:t>
             </a:fld>
             <a:endParaRPr lang="en-US"/>
           </a:p>
@@ -2286,7 +2287,7 @@
           <a:p>
             <a:fld id="{FC088DA2-E2B4-0147-A2CD-628931F110B8}" type="datetimeFigureOut">
               <a:rPr lang="en-US" smtClean="0"/>
-              <a:t>2/25/20</a:t>
+              <a:t>2/16/21</a:t>
             </a:fld>
             <a:endParaRPr lang="en-US"/>
           </a:p>
@@ -2543,7 +2544,7 @@
           <a:p>
             <a:fld id="{FC088DA2-E2B4-0147-A2CD-628931F110B8}" type="datetimeFigureOut">
               <a:rPr lang="en-US" smtClean="0"/>
-              <a:t>2/25/20</a:t>
+              <a:t>2/16/21</a:t>
             </a:fld>
             <a:endParaRPr lang="en-US"/>
           </a:p>
@@ -2756,7 +2757,7 @@
           <a:p>
             <a:fld id="{FC088DA2-E2B4-0147-A2CD-628931F110B8}" type="datetimeFigureOut">
               <a:rPr lang="en-US" smtClean="0"/>
-              <a:t>2/25/20</a:t>
+              <a:t>2/16/21</a:t>
             </a:fld>
             <a:endParaRPr lang="en-US"/>
           </a:p>
@@ -4647,6 +4648,1657 @@
     <p:extLst>
       <p:ext uri="{BB962C8B-B14F-4D97-AF65-F5344CB8AC3E}">
         <p14:creationId xmlns:p14="http://schemas.microsoft.com/office/powerpoint/2010/main" val="3138143107"/>
+      </p:ext>
+    </p:extLst>
+  </p:cSld>
+  <p:clrMapOvr>
+    <a:masterClrMapping/>
+  </p:clrMapOvr>
+  <p:transition spd="med"/>
+  <p:timing>
+    <p:tnLst>
+      <p:par>
+        <p:cTn id="1" dur="indefinite" restart="never" nodeType="tmRoot">
+          <p:childTnLst>
+            <p:seq concurrent="1" nextAc="seek">
+              <p:cTn id="2" dur="indefinite" nodeType="mainSeq">
+                <p:childTnLst>
+                  <p:par>
+                    <p:cTn id="3" fill="hold">
+                      <p:stCondLst>
+                        <p:cond delay="indefinite"/>
+                      </p:stCondLst>
+                      <p:childTnLst>
+                        <p:par>
+                          <p:cTn id="4" fill="hold">
+                            <p:stCondLst>
+                              <p:cond delay="0"/>
+                            </p:stCondLst>
+                            <p:childTnLst>
+                              <p:par>
+                                <p:cTn id="5" presetID="1" presetClass="entr" presetSubtype="0" fill="hold" nodeType="clickEffect">
+                                  <p:stCondLst>
+                                    <p:cond delay="0"/>
+                                  </p:stCondLst>
+                                  <p:childTnLst>
+                                    <p:set>
+                                      <p:cBhvr>
+                                        <p:cTn id="6" dur="1" fill="hold">
+                                          <p:stCondLst>
+                                            <p:cond delay="0"/>
+                                          </p:stCondLst>
+                                        </p:cTn>
+                                        <p:tgtEl>
+                                          <p:spTgt spid="27"/>
+                                        </p:tgtEl>
+                                        <p:attrNameLst>
+                                          <p:attrName>style.visibility</p:attrName>
+                                        </p:attrNameLst>
+                                      </p:cBhvr>
+                                      <p:to>
+                                        <p:strVal val="visible"/>
+                                      </p:to>
+                                    </p:set>
+                                  </p:childTnLst>
+                                </p:cTn>
+                              </p:par>
+                            </p:childTnLst>
+                          </p:cTn>
+                        </p:par>
+                      </p:childTnLst>
+                    </p:cTn>
+                  </p:par>
+                </p:childTnLst>
+              </p:cTn>
+              <p:prevCondLst>
+                <p:cond evt="onPrev" delay="0">
+                  <p:tgtEl>
+                    <p:sldTgt/>
+                  </p:tgtEl>
+                </p:cond>
+              </p:prevCondLst>
+              <p:nextCondLst>
+                <p:cond evt="onNext" delay="0">
+                  <p:tgtEl>
+                    <p:sldTgt/>
+                  </p:tgtEl>
+                </p:cond>
+              </p:nextCondLst>
+            </p:seq>
+          </p:childTnLst>
+        </p:cTn>
+      </p:par>
+    </p:tnLst>
+  </p:timing>
+</p:sld>
+</file>
+
+<file path=ppt/slides/slide2.xml><?xml version="1.0" encoding="utf-8"?>
+<p:sld xmlns:a="http://schemas.openxmlformats.org/drawingml/2006/main" xmlns:r="http://schemas.openxmlformats.org/officeDocument/2006/relationships" xmlns:p="http://schemas.openxmlformats.org/presentationml/2006/main">
+  <p:cSld>
+    <p:spTree>
+      <p:nvGrpSpPr>
+        <p:cNvPr id="1" name=""/>
+        <p:cNvGrpSpPr/>
+        <p:nvPr/>
+      </p:nvGrpSpPr>
+      <p:grpSpPr>
+        <a:xfrm>
+          <a:off x="0" y="0"/>
+          <a:ext cx="0" cy="0"/>
+          <a:chOff x="0" y="0"/>
+          <a:chExt cx="0" cy="0"/>
+        </a:xfrm>
+      </p:grpSpPr>
+      <p:sp>
+        <p:nvSpPr>
+          <p:cNvPr id="67" name="Rectangle 66">
+            <a:extLst>
+              <a:ext uri="{FF2B5EF4-FFF2-40B4-BE49-F238E27FC236}">
+                <a16:creationId xmlns:a16="http://schemas.microsoft.com/office/drawing/2014/main" id="{FCF27F4F-7A19-444F-B766-EBBC70336111}"/>
+              </a:ext>
+            </a:extLst>
+          </p:cNvPr>
+          <p:cNvSpPr/>
+          <p:nvPr/>
+        </p:nvSpPr>
+        <p:spPr>
+          <a:xfrm>
+            <a:off x="4133700" y="1352579"/>
+            <a:ext cx="1677080" cy="1261314"/>
+          </a:xfrm>
+          <a:prstGeom prst="rect">
+            <a:avLst/>
+          </a:prstGeom>
+          <a:noFill/>
+          <a:ln w="12700" cap="flat" cmpd="sng" algn="ctr">
+            <a:solidFill>
+              <a:srgbClr val="5B9BD5">
+                <a:shade val="50000"/>
+              </a:srgbClr>
+            </a:solidFill>
+            <a:prstDash val="solid"/>
+            <a:miter lim="800000"/>
+          </a:ln>
+          <a:effectLst/>
+        </p:spPr>
+        <p:txBody>
+          <a:bodyPr rtlCol="0" anchor="ctr"/>
+          <a:lstStyle/>
+          <a:p>
+            <a:pPr algn="ctr" defTabSz="1157114">
+              <a:defRPr/>
+            </a:pPr>
+            <a:endParaRPr lang="en-US" sz="1519" kern="0" dirty="0">
+              <a:solidFill>
+                <a:prstClr val="white"/>
+              </a:solidFill>
+              <a:latin typeface="Calibri" panose="020F0502020204030204"/>
+            </a:endParaRPr>
+          </a:p>
+        </p:txBody>
+      </p:sp>
+      <p:sp>
+        <p:nvSpPr>
+          <p:cNvPr id="74" name="Rectangle 73">
+            <a:extLst>
+              <a:ext uri="{FF2B5EF4-FFF2-40B4-BE49-F238E27FC236}">
+                <a16:creationId xmlns:a16="http://schemas.microsoft.com/office/drawing/2014/main" id="{0D6D1A5E-6E02-D144-889C-638C81B4CEE4}"/>
+              </a:ext>
+            </a:extLst>
+          </p:cNvPr>
+          <p:cNvSpPr/>
+          <p:nvPr/>
+        </p:nvSpPr>
+        <p:spPr>
+          <a:xfrm>
+            <a:off x="5866354" y="1353121"/>
+            <a:ext cx="1677080" cy="1260772"/>
+          </a:xfrm>
+          <a:prstGeom prst="rect">
+            <a:avLst/>
+          </a:prstGeom>
+          <a:noFill/>
+          <a:ln w="12700" cap="flat" cmpd="sng" algn="ctr">
+            <a:solidFill>
+              <a:srgbClr val="5B9BD5">
+                <a:shade val="50000"/>
+              </a:srgbClr>
+            </a:solidFill>
+            <a:prstDash val="solid"/>
+            <a:miter lim="800000"/>
+          </a:ln>
+          <a:effectLst/>
+        </p:spPr>
+        <p:txBody>
+          <a:bodyPr rtlCol="0" anchor="ctr"/>
+          <a:lstStyle/>
+          <a:p>
+            <a:pPr algn="ctr" defTabSz="1157114">
+              <a:defRPr/>
+            </a:pPr>
+            <a:endParaRPr lang="en-US" sz="1519" kern="0" dirty="0">
+              <a:solidFill>
+                <a:prstClr val="white"/>
+              </a:solidFill>
+              <a:latin typeface="Calibri" panose="020F0502020204030204"/>
+            </a:endParaRPr>
+          </a:p>
+        </p:txBody>
+      </p:sp>
+      <p:pic>
+        <p:nvPicPr>
+          <p:cNvPr id="73" name="Picture 72">
+            <a:extLst>
+              <a:ext uri="{FF2B5EF4-FFF2-40B4-BE49-F238E27FC236}">
+                <a16:creationId xmlns:a16="http://schemas.microsoft.com/office/drawing/2014/main" id="{13D60420-0E9F-854C-A8F2-8ABED32217C1}"/>
+              </a:ext>
+            </a:extLst>
+          </p:cNvPr>
+          <p:cNvPicPr>
+            <a:picLocks noChangeAspect="1"/>
+          </p:cNvPicPr>
+          <p:nvPr/>
+        </p:nvPicPr>
+        <p:blipFill>
+          <a:blip r:embed="rId2">
+            <a:extLst>
+              <a:ext uri="{28A0092B-C50C-407E-A947-70E740481C1C}">
+                <a14:useLocalDpi xmlns:a14="http://schemas.microsoft.com/office/drawing/2010/main" val="0"/>
+              </a:ext>
+            </a:extLst>
+          </a:blip>
+          <a:stretch>
+            <a:fillRect/>
+          </a:stretch>
+        </p:blipFill>
+        <p:spPr>
+          <a:xfrm>
+            <a:off x="5932929" y="1646626"/>
+            <a:ext cx="1522441" cy="627661"/>
+          </a:xfrm>
+          <a:prstGeom prst="rect">
+            <a:avLst/>
+          </a:prstGeom>
+        </p:spPr>
+      </p:pic>
+      <p:cxnSp>
+        <p:nvCxnSpPr>
+          <p:cNvPr id="77" name="Straight Arrow Connector 76">
+            <a:extLst>
+              <a:ext uri="{FF2B5EF4-FFF2-40B4-BE49-F238E27FC236}">
+                <a16:creationId xmlns:a16="http://schemas.microsoft.com/office/drawing/2014/main" id="{A8ED9215-7D83-8248-939A-6BF718E34249}"/>
+              </a:ext>
+            </a:extLst>
+          </p:cNvPr>
+          <p:cNvCxnSpPr>
+            <a:cxnSpLocks/>
+          </p:cNvCxnSpPr>
+          <p:nvPr/>
+        </p:nvCxnSpPr>
+        <p:spPr>
+          <a:xfrm>
+            <a:off x="1737522" y="725049"/>
+            <a:ext cx="0" cy="618766"/>
+          </a:xfrm>
+          <a:prstGeom prst="straightConnector1">
+            <a:avLst/>
+          </a:prstGeom>
+          <a:noFill/>
+          <a:ln w="25400" cap="flat">
+            <a:solidFill>
+              <a:schemeClr val="accent1"/>
+            </a:solidFill>
+            <a:prstDash val="solid"/>
+            <a:round/>
+            <a:tailEnd type="triangle"/>
+          </a:ln>
+          <a:effectLst>
+            <a:outerShdw blurRad="38100" dist="20000" dir="5400000" rotWithShape="0">
+              <a:srgbClr val="000000">
+                <a:alpha val="38000"/>
+              </a:srgbClr>
+            </a:outerShdw>
+          </a:effectLst>
+          <a:sp3d/>
+        </p:spPr>
+        <p:style>
+          <a:lnRef idx="0">
+            <a:scrgbClr r="0" g="0" b="0"/>
+          </a:lnRef>
+          <a:fillRef idx="0">
+            <a:scrgbClr r="0" g="0" b="0"/>
+          </a:fillRef>
+          <a:effectRef idx="0">
+            <a:scrgbClr r="0" g="0" b="0"/>
+          </a:effectRef>
+          <a:fontRef idx="none"/>
+        </p:style>
+      </p:cxnSp>
+      <p:cxnSp>
+        <p:nvCxnSpPr>
+          <p:cNvPr id="78" name="Straight Arrow Connector 77">
+            <a:extLst>
+              <a:ext uri="{FF2B5EF4-FFF2-40B4-BE49-F238E27FC236}">
+                <a16:creationId xmlns:a16="http://schemas.microsoft.com/office/drawing/2014/main" id="{D3A0E8EA-A5D2-EB4E-BE91-FC83090F1128}"/>
+              </a:ext>
+            </a:extLst>
+          </p:cNvPr>
+          <p:cNvCxnSpPr>
+            <a:cxnSpLocks/>
+          </p:cNvCxnSpPr>
+          <p:nvPr/>
+        </p:nvCxnSpPr>
+        <p:spPr>
+          <a:xfrm flipV="1">
+            <a:off x="2086711" y="717989"/>
+            <a:ext cx="0" cy="618766"/>
+          </a:xfrm>
+          <a:prstGeom prst="straightConnector1">
+            <a:avLst/>
+          </a:prstGeom>
+          <a:noFill/>
+          <a:ln w="25400" cap="flat">
+            <a:solidFill>
+              <a:schemeClr val="accent1"/>
+            </a:solidFill>
+            <a:prstDash val="solid"/>
+            <a:round/>
+            <a:tailEnd type="triangle"/>
+          </a:ln>
+          <a:effectLst>
+            <a:outerShdw blurRad="38100" dist="20000" dir="5400000" rotWithShape="0">
+              <a:srgbClr val="000000">
+                <a:alpha val="38000"/>
+              </a:srgbClr>
+            </a:outerShdw>
+          </a:effectLst>
+          <a:sp3d/>
+        </p:spPr>
+        <p:style>
+          <a:lnRef idx="0">
+            <a:scrgbClr r="0" g="0" b="0"/>
+          </a:lnRef>
+          <a:fillRef idx="0">
+            <a:scrgbClr r="0" g="0" b="0"/>
+          </a:fillRef>
+          <a:effectRef idx="0">
+            <a:scrgbClr r="0" g="0" b="0"/>
+          </a:effectRef>
+          <a:fontRef idx="none"/>
+        </p:style>
+      </p:cxnSp>
+      <p:sp>
+        <p:nvSpPr>
+          <p:cNvPr id="90" name="Rectangle 89">
+            <a:extLst>
+              <a:ext uri="{FF2B5EF4-FFF2-40B4-BE49-F238E27FC236}">
+                <a16:creationId xmlns:a16="http://schemas.microsoft.com/office/drawing/2014/main" id="{7446DACA-3781-654D-8F5B-48C8E8F6990C}"/>
+              </a:ext>
+            </a:extLst>
+          </p:cNvPr>
+          <p:cNvSpPr/>
+          <p:nvPr/>
+        </p:nvSpPr>
+        <p:spPr>
+          <a:xfrm>
+            <a:off x="4864464" y="90397"/>
+            <a:ext cx="1838381" cy="627661"/>
+          </a:xfrm>
+          <a:prstGeom prst="rect">
+            <a:avLst/>
+          </a:prstGeom>
+          <a:solidFill>
+            <a:schemeClr val="accent1"/>
+          </a:solidFill>
+          <a:ln w="12700" cap="flat" cmpd="sng" algn="ctr">
+            <a:solidFill>
+              <a:srgbClr val="5B9BD5">
+                <a:shade val="50000"/>
+              </a:srgbClr>
+            </a:solidFill>
+            <a:prstDash val="solid"/>
+            <a:miter lim="800000"/>
+          </a:ln>
+          <a:effectLst/>
+        </p:spPr>
+        <p:txBody>
+          <a:bodyPr rtlCol="0" anchor="ctr"/>
+          <a:lstStyle/>
+          <a:p>
+            <a:pPr algn="ctr" defTabSz="1157114">
+              <a:defRPr/>
+            </a:pPr>
+            <a:r>
+              <a:rPr lang="en-US" sz="1519" kern="0" dirty="0">
+                <a:solidFill>
+                  <a:prstClr val="white"/>
+                </a:solidFill>
+                <a:latin typeface="Calibri" panose="020F0502020204030204"/>
+              </a:rPr>
+              <a:t>Client Application</a:t>
+            </a:r>
+          </a:p>
+        </p:txBody>
+      </p:sp>
+      <p:cxnSp>
+        <p:nvCxnSpPr>
+          <p:cNvPr id="93" name="Straight Arrow Connector 92">
+            <a:extLst>
+              <a:ext uri="{FF2B5EF4-FFF2-40B4-BE49-F238E27FC236}">
+                <a16:creationId xmlns:a16="http://schemas.microsoft.com/office/drawing/2014/main" id="{8E044119-D61C-A64B-9B45-307C4FF36824}"/>
+              </a:ext>
+            </a:extLst>
+          </p:cNvPr>
+          <p:cNvCxnSpPr>
+            <a:cxnSpLocks/>
+          </p:cNvCxnSpPr>
+          <p:nvPr/>
+        </p:nvCxnSpPr>
+        <p:spPr>
+          <a:xfrm>
+            <a:off x="5188488" y="725053"/>
+            <a:ext cx="0" cy="627661"/>
+          </a:xfrm>
+          <a:prstGeom prst="straightConnector1">
+            <a:avLst/>
+          </a:prstGeom>
+          <a:noFill/>
+          <a:ln w="25400" cap="flat">
+            <a:solidFill>
+              <a:schemeClr val="accent1"/>
+            </a:solidFill>
+            <a:prstDash val="solid"/>
+            <a:round/>
+            <a:tailEnd type="triangle"/>
+          </a:ln>
+          <a:effectLst>
+            <a:outerShdw blurRad="38100" dist="20000" dir="5400000" rotWithShape="0">
+              <a:srgbClr val="000000">
+                <a:alpha val="38000"/>
+              </a:srgbClr>
+            </a:outerShdw>
+          </a:effectLst>
+          <a:sp3d/>
+        </p:spPr>
+        <p:style>
+          <a:lnRef idx="0">
+            <a:scrgbClr r="0" g="0" b="0"/>
+          </a:lnRef>
+          <a:fillRef idx="0">
+            <a:scrgbClr r="0" g="0" b="0"/>
+          </a:fillRef>
+          <a:effectRef idx="0">
+            <a:scrgbClr r="0" g="0" b="0"/>
+          </a:effectRef>
+          <a:fontRef idx="none"/>
+        </p:style>
+      </p:cxnSp>
+      <p:cxnSp>
+        <p:nvCxnSpPr>
+          <p:cNvPr id="94" name="Straight Arrow Connector 93">
+            <a:extLst>
+              <a:ext uri="{FF2B5EF4-FFF2-40B4-BE49-F238E27FC236}">
+                <a16:creationId xmlns:a16="http://schemas.microsoft.com/office/drawing/2014/main" id="{AB7ACE88-909B-6D49-8CE5-E3A3B5EDB1CE}"/>
+              </a:ext>
+            </a:extLst>
+          </p:cNvPr>
+          <p:cNvCxnSpPr>
+            <a:cxnSpLocks/>
+          </p:cNvCxnSpPr>
+          <p:nvPr/>
+        </p:nvCxnSpPr>
+        <p:spPr>
+          <a:xfrm flipV="1">
+            <a:off x="5394881" y="717990"/>
+            <a:ext cx="0" cy="631414"/>
+          </a:xfrm>
+          <a:prstGeom prst="straightConnector1">
+            <a:avLst/>
+          </a:prstGeom>
+          <a:noFill/>
+          <a:ln w="25400" cap="flat">
+            <a:solidFill>
+              <a:schemeClr val="accent1"/>
+            </a:solidFill>
+            <a:prstDash val="solid"/>
+            <a:round/>
+            <a:tailEnd type="triangle"/>
+          </a:ln>
+          <a:effectLst>
+            <a:outerShdw blurRad="38100" dist="20000" dir="5400000" rotWithShape="0">
+              <a:srgbClr val="000000">
+                <a:alpha val="38000"/>
+              </a:srgbClr>
+            </a:outerShdw>
+          </a:effectLst>
+          <a:sp3d/>
+        </p:spPr>
+        <p:style>
+          <a:lnRef idx="0">
+            <a:scrgbClr r="0" g="0" b="0"/>
+          </a:lnRef>
+          <a:fillRef idx="0">
+            <a:scrgbClr r="0" g="0" b="0"/>
+          </a:fillRef>
+          <a:effectRef idx="0">
+            <a:scrgbClr r="0" g="0" b="0"/>
+          </a:effectRef>
+          <a:fontRef idx="none"/>
+        </p:style>
+      </p:cxnSp>
+      <p:sp>
+        <p:nvSpPr>
+          <p:cNvPr id="96" name="Rectangle 95">
+            <a:extLst>
+              <a:ext uri="{FF2B5EF4-FFF2-40B4-BE49-F238E27FC236}">
+                <a16:creationId xmlns:a16="http://schemas.microsoft.com/office/drawing/2014/main" id="{BE3C1CE4-E686-F649-89F1-25FEA24B9922}"/>
+              </a:ext>
+            </a:extLst>
+          </p:cNvPr>
+          <p:cNvSpPr/>
+          <p:nvPr/>
+        </p:nvSpPr>
+        <p:spPr>
+          <a:xfrm>
+            <a:off x="5375221" y="893557"/>
+            <a:ext cx="769786" cy="267637"/>
+          </a:xfrm>
+          <a:prstGeom prst="rect">
+            <a:avLst/>
+          </a:prstGeom>
+        </p:spPr>
+        <p:txBody>
+          <a:bodyPr wrap="square">
+            <a:spAutoFit/>
+          </a:bodyPr>
+          <a:lstStyle/>
+          <a:p>
+            <a:r>
+              <a:rPr lang="en-US" sz="1139" dirty="0"/>
+              <a:t>metadata</a:t>
+            </a:r>
+          </a:p>
+        </p:txBody>
+      </p:sp>
+      <p:sp>
+        <p:nvSpPr>
+          <p:cNvPr id="97" name="Rectangle 96">
+            <a:extLst>
+              <a:ext uri="{FF2B5EF4-FFF2-40B4-BE49-F238E27FC236}">
+                <a16:creationId xmlns:a16="http://schemas.microsoft.com/office/drawing/2014/main" id="{CB57DDCD-0D6D-F640-908D-82E74D58FDD5}"/>
+              </a:ext>
+            </a:extLst>
+          </p:cNvPr>
+          <p:cNvSpPr/>
+          <p:nvPr/>
+        </p:nvSpPr>
+        <p:spPr>
+          <a:xfrm>
+            <a:off x="6561973" y="909079"/>
+            <a:ext cx="711930" cy="267637"/>
+          </a:xfrm>
+          <a:prstGeom prst="rect">
+            <a:avLst/>
+          </a:prstGeom>
+        </p:spPr>
+        <p:txBody>
+          <a:bodyPr wrap="square">
+            <a:spAutoFit/>
+          </a:bodyPr>
+          <a:lstStyle/>
+          <a:p>
+            <a:r>
+              <a:rPr lang="en-US" sz="1139" dirty="0"/>
+              <a:t>images</a:t>
+            </a:r>
+          </a:p>
+        </p:txBody>
+      </p:sp>
+      <p:sp>
+        <p:nvSpPr>
+          <p:cNvPr id="98" name="Rectangle 97">
+            <a:extLst>
+              <a:ext uri="{FF2B5EF4-FFF2-40B4-BE49-F238E27FC236}">
+                <a16:creationId xmlns:a16="http://schemas.microsoft.com/office/drawing/2014/main" id="{55FE24FC-E71F-6546-8273-D937EE29BF0F}"/>
+              </a:ext>
+            </a:extLst>
+          </p:cNvPr>
+          <p:cNvSpPr/>
+          <p:nvPr/>
+        </p:nvSpPr>
+        <p:spPr>
+          <a:xfrm>
+            <a:off x="2125015" y="805901"/>
+            <a:ext cx="921353" cy="442942"/>
+          </a:xfrm>
+          <a:prstGeom prst="rect">
+            <a:avLst/>
+          </a:prstGeom>
+        </p:spPr>
+        <p:txBody>
+          <a:bodyPr wrap="square">
+            <a:spAutoFit/>
+          </a:bodyPr>
+          <a:lstStyle/>
+          <a:p>
+            <a:r>
+              <a:rPr lang="en-US" sz="1139" dirty="0"/>
+              <a:t>metadata</a:t>
+            </a:r>
+          </a:p>
+          <a:p>
+            <a:r>
+              <a:rPr lang="en-US" sz="1139" dirty="0"/>
+              <a:t>+ images</a:t>
+            </a:r>
+          </a:p>
+        </p:txBody>
+      </p:sp>
+      <p:pic>
+        <p:nvPicPr>
+          <p:cNvPr id="27" name="Picture 3" descr="Picture 3">
+            <a:extLst>
+              <a:ext uri="{FF2B5EF4-FFF2-40B4-BE49-F238E27FC236}">
+                <a16:creationId xmlns:a16="http://schemas.microsoft.com/office/drawing/2014/main" id="{11F0B70B-5ABC-3E4B-8321-FCA0C3FA72C4}"/>
+              </a:ext>
+            </a:extLst>
+          </p:cNvPr>
+          <p:cNvPicPr>
+            <a:picLocks noChangeAspect="1"/>
+          </p:cNvPicPr>
+          <p:nvPr/>
+        </p:nvPicPr>
+        <p:blipFill>
+          <a:blip r:embed="rId3" cstate="print">
+            <a:extLst>
+              <a:ext uri="{28A0092B-C50C-407E-A947-70E740481C1C}">
+                <a14:useLocalDpi xmlns:a14="http://schemas.microsoft.com/office/drawing/2010/main"/>
+              </a:ext>
+            </a:extLst>
+          </a:blip>
+          <a:stretch>
+            <a:fillRect/>
+          </a:stretch>
+        </p:blipFill>
+        <p:spPr>
+          <a:xfrm>
+            <a:off x="5118732" y="1906130"/>
+            <a:ext cx="629541" cy="324214"/>
+          </a:xfrm>
+          <a:prstGeom prst="rect">
+            <a:avLst/>
+          </a:prstGeom>
+          <a:ln w="12700">
+            <a:miter lim="400000"/>
+          </a:ln>
+        </p:spPr>
+      </p:pic>
+      <p:sp>
+        <p:nvSpPr>
+          <p:cNvPr id="32" name="Rectangle 31">
+            <a:extLst>
+              <a:ext uri="{FF2B5EF4-FFF2-40B4-BE49-F238E27FC236}">
+                <a16:creationId xmlns:a16="http://schemas.microsoft.com/office/drawing/2014/main" id="{68AECD42-F1D0-F844-8983-38925400D123}"/>
+              </a:ext>
+            </a:extLst>
+          </p:cNvPr>
+          <p:cNvSpPr/>
+          <p:nvPr/>
+        </p:nvSpPr>
+        <p:spPr>
+          <a:xfrm>
+            <a:off x="196250" y="2395035"/>
+            <a:ext cx="1236897" cy="218858"/>
+          </a:xfrm>
+          <a:prstGeom prst="rect">
+            <a:avLst/>
+          </a:prstGeom>
+          <a:solidFill>
+            <a:srgbClr val="70AD47">
+              <a:lumMod val="75000"/>
+            </a:srgbClr>
+          </a:solidFill>
+          <a:ln w="12700" cap="flat" cmpd="sng" algn="ctr">
+            <a:solidFill>
+              <a:srgbClr val="5B9BD5">
+                <a:shade val="50000"/>
+              </a:srgbClr>
+            </a:solidFill>
+            <a:prstDash val="solid"/>
+            <a:miter lim="800000"/>
+          </a:ln>
+          <a:effectLst/>
+        </p:spPr>
+        <p:txBody>
+          <a:bodyPr rtlCol="0" anchor="ctr"/>
+          <a:lstStyle/>
+          <a:p>
+            <a:pPr algn="ctr" defTabSz="914400">
+              <a:defRPr/>
+            </a:pPr>
+            <a:r>
+              <a:rPr lang="en-US" sz="1200" kern="0" dirty="0">
+                <a:solidFill>
+                  <a:prstClr val="white"/>
+                </a:solidFill>
+                <a:latin typeface="Calibri" panose="020F0502020204030204"/>
+              </a:rPr>
+              <a:t>TileDB</a:t>
+            </a:r>
+          </a:p>
+        </p:txBody>
+      </p:sp>
+      <p:pic>
+        <p:nvPicPr>
+          <p:cNvPr id="33" name="Picture 32">
+            <a:extLst>
+              <a:ext uri="{FF2B5EF4-FFF2-40B4-BE49-F238E27FC236}">
+                <a16:creationId xmlns:a16="http://schemas.microsoft.com/office/drawing/2014/main" id="{A181951B-F5FE-1C41-A7D2-010D4D260A3D}"/>
+              </a:ext>
+            </a:extLst>
+          </p:cNvPr>
+          <p:cNvPicPr>
+            <a:picLocks noChangeAspect="1"/>
+          </p:cNvPicPr>
+          <p:nvPr/>
+        </p:nvPicPr>
+        <p:blipFill rotWithShape="1">
+          <a:blip r:embed="rId4" cstate="print">
+            <a:duotone>
+              <a:srgbClr val="70AD47">
+                <a:shade val="45000"/>
+                <a:satMod val="135000"/>
+              </a:srgbClr>
+              <a:prstClr val="white"/>
+            </a:duotone>
+            <a:extLst>
+              <a:ext uri="{28A0092B-C50C-407E-A947-70E740481C1C}">
+                <a14:useLocalDpi xmlns:a14="http://schemas.microsoft.com/office/drawing/2010/main" val="0"/>
+              </a:ext>
+            </a:extLst>
+          </a:blip>
+          <a:srcRect/>
+          <a:stretch/>
+        </p:blipFill>
+        <p:spPr>
+          <a:xfrm>
+            <a:off x="1179352" y="1639704"/>
+            <a:ext cx="573962" cy="480076"/>
+          </a:xfrm>
+          <a:prstGeom prst="rect">
+            <a:avLst/>
+          </a:prstGeom>
+        </p:spPr>
+      </p:pic>
+      <p:sp>
+        <p:nvSpPr>
+          <p:cNvPr id="34" name="Rectangle 33">
+            <a:extLst>
+              <a:ext uri="{FF2B5EF4-FFF2-40B4-BE49-F238E27FC236}">
+                <a16:creationId xmlns:a16="http://schemas.microsoft.com/office/drawing/2014/main" id="{AAC979EF-863C-6348-BA37-984B92235A29}"/>
+              </a:ext>
+            </a:extLst>
+          </p:cNvPr>
+          <p:cNvSpPr/>
+          <p:nvPr/>
+        </p:nvSpPr>
+        <p:spPr>
+          <a:xfrm>
+            <a:off x="2733266" y="2171825"/>
+            <a:ext cx="1177459" cy="442073"/>
+          </a:xfrm>
+          <a:prstGeom prst="rect">
+            <a:avLst/>
+          </a:prstGeom>
+          <a:solidFill>
+            <a:srgbClr val="70AD47">
+              <a:lumMod val="75000"/>
+            </a:srgbClr>
+          </a:solidFill>
+          <a:ln w="12700" cap="flat" cmpd="sng" algn="ctr">
+            <a:solidFill>
+              <a:srgbClr val="5B9BD5">
+                <a:shade val="50000"/>
+              </a:srgbClr>
+            </a:solidFill>
+            <a:prstDash val="solid"/>
+            <a:miter lim="800000"/>
+          </a:ln>
+          <a:effectLst/>
+        </p:spPr>
+        <p:txBody>
+          <a:bodyPr lIns="0" rIns="0" rtlCol="0" anchor="ctr"/>
+          <a:lstStyle/>
+          <a:p>
+            <a:pPr algn="ctr" defTabSz="914400">
+              <a:defRPr/>
+            </a:pPr>
+            <a:r>
+              <a:rPr lang="en-US" sz="1100" kern="0" dirty="0">
+                <a:solidFill>
+                  <a:prstClr val="white"/>
+                </a:solidFill>
+                <a:latin typeface="Calibri" panose="020F0502020204030204"/>
+              </a:rPr>
+              <a:t>Persistent Memory</a:t>
+            </a:r>
+          </a:p>
+          <a:p>
+            <a:pPr algn="ctr" defTabSz="914400">
+              <a:defRPr/>
+            </a:pPr>
+            <a:r>
+              <a:rPr lang="en-US" sz="1100" kern="0" dirty="0">
+                <a:solidFill>
+                  <a:prstClr val="white"/>
+                </a:solidFill>
+                <a:latin typeface="Calibri" panose="020F0502020204030204"/>
+              </a:rPr>
+              <a:t>Graph DB</a:t>
+            </a:r>
+          </a:p>
+        </p:txBody>
+      </p:sp>
+      <p:sp>
+        <p:nvSpPr>
+          <p:cNvPr id="37" name="Rectangle 36">
+            <a:extLst>
+              <a:ext uri="{FF2B5EF4-FFF2-40B4-BE49-F238E27FC236}">
+                <a16:creationId xmlns:a16="http://schemas.microsoft.com/office/drawing/2014/main" id="{5349583E-B21C-D542-BA06-A79D4CB65685}"/>
+              </a:ext>
+            </a:extLst>
+          </p:cNvPr>
+          <p:cNvSpPr/>
+          <p:nvPr/>
+        </p:nvSpPr>
+        <p:spPr>
+          <a:xfrm>
+            <a:off x="1464759" y="2395035"/>
+            <a:ext cx="1236897" cy="218858"/>
+          </a:xfrm>
+          <a:prstGeom prst="rect">
+            <a:avLst/>
+          </a:prstGeom>
+          <a:solidFill>
+            <a:srgbClr val="70AD47">
+              <a:lumMod val="75000"/>
+            </a:srgbClr>
+          </a:solidFill>
+          <a:ln w="12700" cap="flat" cmpd="sng" algn="ctr">
+            <a:solidFill>
+              <a:srgbClr val="5B9BD5">
+                <a:shade val="50000"/>
+              </a:srgbClr>
+            </a:solidFill>
+            <a:prstDash val="solid"/>
+            <a:miter lim="800000"/>
+          </a:ln>
+          <a:effectLst/>
+        </p:spPr>
+        <p:txBody>
+          <a:bodyPr rtlCol="0" anchor="ctr"/>
+          <a:lstStyle/>
+          <a:p>
+            <a:pPr algn="ctr" defTabSz="914400">
+              <a:defRPr/>
+            </a:pPr>
+            <a:r>
+              <a:rPr lang="en-US" sz="1200" kern="0" dirty="0">
+                <a:solidFill>
+                  <a:prstClr val="white"/>
+                </a:solidFill>
+                <a:latin typeface="Calibri" panose="020F0502020204030204"/>
+              </a:rPr>
+              <a:t>OpenCV</a:t>
+            </a:r>
+          </a:p>
+        </p:txBody>
+      </p:sp>
+      <p:pic>
+        <p:nvPicPr>
+          <p:cNvPr id="38" name="Picture 37">
+            <a:extLst>
+              <a:ext uri="{FF2B5EF4-FFF2-40B4-BE49-F238E27FC236}">
+                <a16:creationId xmlns:a16="http://schemas.microsoft.com/office/drawing/2014/main" id="{52EBDBBA-FDF2-344B-92C0-13B6AA2B5FA2}"/>
+              </a:ext>
+            </a:extLst>
+          </p:cNvPr>
+          <p:cNvPicPr>
+            <a:picLocks noChangeAspect="1"/>
+          </p:cNvPicPr>
+          <p:nvPr/>
+        </p:nvPicPr>
+        <p:blipFill>
+          <a:blip r:embed="rId5" cstate="print">
+            <a:duotone>
+              <a:srgbClr val="70AD47">
+                <a:shade val="45000"/>
+                <a:satMod val="135000"/>
+              </a:srgbClr>
+              <a:prstClr val="white"/>
+            </a:duotone>
+            <a:extLst>
+              <a:ext uri="{28A0092B-C50C-407E-A947-70E740481C1C}">
+                <a14:useLocalDpi xmlns:a14="http://schemas.microsoft.com/office/drawing/2010/main" val="0"/>
+              </a:ext>
+            </a:extLst>
+          </a:blip>
+          <a:stretch>
+            <a:fillRect/>
+          </a:stretch>
+        </p:blipFill>
+        <p:spPr>
+          <a:xfrm>
+            <a:off x="2006116" y="1639704"/>
+            <a:ext cx="570396" cy="480076"/>
+          </a:xfrm>
+          <a:prstGeom prst="rect">
+            <a:avLst/>
+          </a:prstGeom>
+        </p:spPr>
+      </p:pic>
+      <p:pic>
+        <p:nvPicPr>
+          <p:cNvPr id="39" name="Picture 38">
+            <a:extLst>
+              <a:ext uri="{FF2B5EF4-FFF2-40B4-BE49-F238E27FC236}">
+                <a16:creationId xmlns:a16="http://schemas.microsoft.com/office/drawing/2014/main" id="{6382284A-FA4A-2246-85A9-DC1259C1CAAD}"/>
+              </a:ext>
+            </a:extLst>
+          </p:cNvPr>
+          <p:cNvPicPr>
+            <a:picLocks noChangeAspect="1"/>
+          </p:cNvPicPr>
+          <p:nvPr/>
+        </p:nvPicPr>
+        <p:blipFill>
+          <a:blip r:embed="rId6" cstate="print">
+            <a:duotone>
+              <a:prstClr val="black"/>
+              <a:srgbClr val="70AD47">
+                <a:tint val="45000"/>
+                <a:satMod val="400000"/>
+              </a:srgbClr>
+            </a:duotone>
+            <a:extLst>
+              <a:ext uri="{28A0092B-C50C-407E-A947-70E740481C1C}">
+                <a14:useLocalDpi xmlns:a14="http://schemas.microsoft.com/office/drawing/2010/main" val="0"/>
+              </a:ext>
+            </a:extLst>
+          </a:blip>
+          <a:stretch>
+            <a:fillRect/>
+          </a:stretch>
+        </p:blipFill>
+        <p:spPr>
+          <a:xfrm>
+            <a:off x="3061438" y="1628274"/>
+            <a:ext cx="434256" cy="480076"/>
+          </a:xfrm>
+          <a:prstGeom prst="rect">
+            <a:avLst/>
+          </a:prstGeom>
+        </p:spPr>
+      </p:pic>
+      <p:pic>
+        <p:nvPicPr>
+          <p:cNvPr id="40" name="Picture 39">
+            <a:extLst>
+              <a:ext uri="{FF2B5EF4-FFF2-40B4-BE49-F238E27FC236}">
+                <a16:creationId xmlns:a16="http://schemas.microsoft.com/office/drawing/2014/main" id="{2982CF5A-2465-CB46-BF0C-AF60E94270DC}"/>
+              </a:ext>
+            </a:extLst>
+          </p:cNvPr>
+          <p:cNvPicPr>
+            <a:picLocks noChangeAspect="1"/>
+          </p:cNvPicPr>
+          <p:nvPr/>
+        </p:nvPicPr>
+        <p:blipFill rotWithShape="1">
+          <a:blip r:embed="rId7" cstate="print">
+            <a:duotone>
+              <a:srgbClr val="70AD47">
+                <a:shade val="45000"/>
+                <a:satMod val="135000"/>
+              </a:srgbClr>
+              <a:prstClr val="white"/>
+            </a:duotone>
+            <a:extLst>
+              <a:ext uri="{28A0092B-C50C-407E-A947-70E740481C1C}">
+                <a14:useLocalDpi xmlns:a14="http://schemas.microsoft.com/office/drawing/2010/main" val="0"/>
+              </a:ext>
+            </a:extLst>
+          </a:blip>
+          <a:srcRect t="26890" r="60350"/>
+          <a:stretch/>
+        </p:blipFill>
+        <p:spPr>
+          <a:xfrm>
+            <a:off x="435539" y="1639704"/>
+            <a:ext cx="491015" cy="480076"/>
+          </a:xfrm>
+          <a:prstGeom prst="rect">
+            <a:avLst/>
+          </a:prstGeom>
+        </p:spPr>
+      </p:pic>
+      <p:sp>
+        <p:nvSpPr>
+          <p:cNvPr id="41" name="Rectangle 40">
+            <a:extLst>
+              <a:ext uri="{FF2B5EF4-FFF2-40B4-BE49-F238E27FC236}">
+                <a16:creationId xmlns:a16="http://schemas.microsoft.com/office/drawing/2014/main" id="{CE1258CD-3649-BA42-BBEC-D47F01218646}"/>
+              </a:ext>
+            </a:extLst>
+          </p:cNvPr>
+          <p:cNvSpPr/>
+          <p:nvPr/>
+        </p:nvSpPr>
+        <p:spPr>
+          <a:xfrm>
+            <a:off x="188103" y="1331253"/>
+            <a:ext cx="3708003" cy="250687"/>
+          </a:xfrm>
+          <a:prstGeom prst="rect">
+            <a:avLst/>
+          </a:prstGeom>
+          <a:solidFill>
+            <a:srgbClr val="70AD47">
+              <a:lumMod val="75000"/>
+            </a:srgbClr>
+          </a:solidFill>
+          <a:ln w="12700" cap="flat" cmpd="sng" algn="ctr">
+            <a:solidFill>
+              <a:srgbClr val="5B9BD5">
+                <a:shade val="50000"/>
+              </a:srgbClr>
+            </a:solidFill>
+            <a:prstDash val="solid"/>
+            <a:miter lim="800000"/>
+          </a:ln>
+          <a:effectLst/>
+        </p:spPr>
+        <p:txBody>
+          <a:bodyPr rtlCol="0" anchor="ctr"/>
+          <a:lstStyle/>
+          <a:p>
+            <a:pPr algn="ctr" defTabSz="914400">
+              <a:defRPr/>
+            </a:pPr>
+            <a:r>
+              <a:rPr lang="en-US" sz="1400" kern="0" dirty="0">
+                <a:solidFill>
+                  <a:prstClr val="white"/>
+                </a:solidFill>
+                <a:latin typeface="Calibri" panose="020F0502020204030204"/>
+              </a:rPr>
+              <a:t>Request Server</a:t>
+            </a:r>
+          </a:p>
+        </p:txBody>
+      </p:sp>
+      <p:sp>
+        <p:nvSpPr>
+          <p:cNvPr id="42" name="Rectangle 41">
+            <a:extLst>
+              <a:ext uri="{FF2B5EF4-FFF2-40B4-BE49-F238E27FC236}">
+                <a16:creationId xmlns:a16="http://schemas.microsoft.com/office/drawing/2014/main" id="{AF16CA9D-27C2-E342-9119-B604E47914C4}"/>
+              </a:ext>
+            </a:extLst>
+          </p:cNvPr>
+          <p:cNvSpPr/>
+          <p:nvPr/>
+        </p:nvSpPr>
+        <p:spPr>
+          <a:xfrm>
+            <a:off x="196250" y="2171821"/>
+            <a:ext cx="2505405" cy="198962"/>
+          </a:xfrm>
+          <a:prstGeom prst="rect">
+            <a:avLst/>
+          </a:prstGeom>
+          <a:solidFill>
+            <a:srgbClr val="70AD47">
+              <a:lumMod val="75000"/>
+            </a:srgbClr>
+          </a:solidFill>
+          <a:ln w="12700" cap="flat" cmpd="sng" algn="ctr">
+            <a:solidFill>
+              <a:srgbClr val="5B9BD5">
+                <a:shade val="50000"/>
+              </a:srgbClr>
+            </a:solidFill>
+            <a:prstDash val="solid"/>
+            <a:miter lim="800000"/>
+          </a:ln>
+          <a:effectLst/>
+        </p:spPr>
+        <p:txBody>
+          <a:bodyPr rtlCol="0" anchor="ctr"/>
+          <a:lstStyle/>
+          <a:p>
+            <a:pPr algn="ctr" defTabSz="914400">
+              <a:defRPr/>
+            </a:pPr>
+            <a:r>
+              <a:rPr lang="en-US" sz="1200" kern="0" dirty="0">
+                <a:solidFill>
+                  <a:prstClr val="white"/>
+                </a:solidFill>
+                <a:latin typeface="Calibri" panose="020F0502020204030204"/>
+              </a:rPr>
+              <a:t>Visual Compute Module</a:t>
+            </a:r>
+          </a:p>
+        </p:txBody>
+      </p:sp>
+      <p:pic>
+        <p:nvPicPr>
+          <p:cNvPr id="56" name="kisspng-database-ico-icon-database-icons-5a76f02a410241.1734604215177441702663.png" descr="kisspng-database-ico-icon-database-icons-5a76f02a410241.1734604215177441702663.png">
+            <a:extLst>
+              <a:ext uri="{FF2B5EF4-FFF2-40B4-BE49-F238E27FC236}">
+                <a16:creationId xmlns:a16="http://schemas.microsoft.com/office/drawing/2014/main" id="{4EA3919F-3FBA-694D-893C-977B9BA84F7E}"/>
+              </a:ext>
+            </a:extLst>
+          </p:cNvPr>
+          <p:cNvPicPr>
+            <a:picLocks noChangeAspect="1"/>
+          </p:cNvPicPr>
+          <p:nvPr/>
+        </p:nvPicPr>
+        <p:blipFill>
+          <a:blip r:embed="rId8"/>
+          <a:stretch>
+            <a:fillRect/>
+          </a:stretch>
+        </p:blipFill>
+        <p:spPr>
+          <a:xfrm>
+            <a:off x="435535" y="2665935"/>
+            <a:ext cx="810498" cy="810498"/>
+          </a:xfrm>
+          <a:prstGeom prst="rect">
+            <a:avLst/>
+          </a:prstGeom>
+          <a:ln w="12700">
+            <a:miter lim="400000"/>
+          </a:ln>
+        </p:spPr>
+      </p:pic>
+      <p:pic>
+        <p:nvPicPr>
+          <p:cNvPr id="57" name="kisspng-database-ico-icon-database-icons-5a76f02a410241.1734604215177441702663.png" descr="kisspng-database-ico-icon-database-icons-5a76f02a410241.1734604215177441702663.png">
+            <a:extLst>
+              <a:ext uri="{FF2B5EF4-FFF2-40B4-BE49-F238E27FC236}">
+                <a16:creationId xmlns:a16="http://schemas.microsoft.com/office/drawing/2014/main" id="{3137EBC0-15CD-4543-99D2-C29E35EC24D8}"/>
+              </a:ext>
+            </a:extLst>
+          </p:cNvPr>
+          <p:cNvPicPr>
+            <a:picLocks noChangeAspect="1"/>
+          </p:cNvPicPr>
+          <p:nvPr/>
+        </p:nvPicPr>
+        <p:blipFill>
+          <a:blip r:embed="rId8"/>
+          <a:stretch>
+            <a:fillRect/>
+          </a:stretch>
+        </p:blipFill>
+        <p:spPr>
+          <a:xfrm>
+            <a:off x="1261058" y="2665935"/>
+            <a:ext cx="810498" cy="810498"/>
+          </a:xfrm>
+          <a:prstGeom prst="rect">
+            <a:avLst/>
+          </a:prstGeom>
+          <a:ln w="12700">
+            <a:miter lim="400000"/>
+          </a:ln>
+        </p:spPr>
+      </p:pic>
+      <p:pic>
+        <p:nvPicPr>
+          <p:cNvPr id="58" name="kisspng-database-ico-icon-database-icons-5a76f02a410241.1734604215177441702663.png" descr="kisspng-database-ico-icon-database-icons-5a76f02a410241.1734604215177441702663.png">
+            <a:extLst>
+              <a:ext uri="{FF2B5EF4-FFF2-40B4-BE49-F238E27FC236}">
+                <a16:creationId xmlns:a16="http://schemas.microsoft.com/office/drawing/2014/main" id="{8D6E0A2A-73C2-7449-8309-ED607C595676}"/>
+              </a:ext>
+            </a:extLst>
+          </p:cNvPr>
+          <p:cNvPicPr>
+            <a:picLocks noChangeAspect="1"/>
+          </p:cNvPicPr>
+          <p:nvPr/>
+        </p:nvPicPr>
+        <p:blipFill>
+          <a:blip r:embed="rId8"/>
+          <a:stretch>
+            <a:fillRect/>
+          </a:stretch>
+        </p:blipFill>
+        <p:spPr>
+          <a:xfrm>
+            <a:off x="2083203" y="2665935"/>
+            <a:ext cx="810498" cy="810498"/>
+          </a:xfrm>
+          <a:prstGeom prst="rect">
+            <a:avLst/>
+          </a:prstGeom>
+          <a:ln w="12700">
+            <a:miter lim="400000"/>
+          </a:ln>
+        </p:spPr>
+      </p:pic>
+      <p:pic>
+        <p:nvPicPr>
+          <p:cNvPr id="59" name="kisspng-database-ico-icon-database-icons-5a76f02a410241.1734604215177441702663.png" descr="kisspng-database-ico-icon-database-icons-5a76f02a410241.1734604215177441702663.png">
+            <a:extLst>
+              <a:ext uri="{FF2B5EF4-FFF2-40B4-BE49-F238E27FC236}">
+                <a16:creationId xmlns:a16="http://schemas.microsoft.com/office/drawing/2014/main" id="{64E41AEA-C66A-9743-A624-67ABBA69F47C}"/>
+              </a:ext>
+            </a:extLst>
+          </p:cNvPr>
+          <p:cNvPicPr>
+            <a:picLocks noChangeAspect="1"/>
+          </p:cNvPicPr>
+          <p:nvPr/>
+        </p:nvPicPr>
+        <p:blipFill>
+          <a:blip r:embed="rId8"/>
+          <a:stretch>
+            <a:fillRect/>
+          </a:stretch>
+        </p:blipFill>
+        <p:spPr>
+          <a:xfrm>
+            <a:off x="2905348" y="2665935"/>
+            <a:ext cx="810498" cy="810498"/>
+          </a:xfrm>
+          <a:prstGeom prst="rect">
+            <a:avLst/>
+          </a:prstGeom>
+          <a:ln w="12700">
+            <a:miter lim="400000"/>
+          </a:ln>
+        </p:spPr>
+      </p:pic>
+      <p:pic>
+        <p:nvPicPr>
+          <p:cNvPr id="60" name="kisspng-database-ico-icon-database-icons-5a76f02a410241.1734604215177441702663.png" descr="kisspng-database-ico-icon-database-icons-5a76f02a410241.1734604215177441702663.png">
+            <a:extLst>
+              <a:ext uri="{FF2B5EF4-FFF2-40B4-BE49-F238E27FC236}">
+                <a16:creationId xmlns:a16="http://schemas.microsoft.com/office/drawing/2014/main" id="{75684B21-A4B8-2F45-AE0C-BC15137106D7}"/>
+              </a:ext>
+            </a:extLst>
+          </p:cNvPr>
+          <p:cNvPicPr>
+            <a:picLocks noChangeAspect="1"/>
+          </p:cNvPicPr>
+          <p:nvPr/>
+        </p:nvPicPr>
+        <p:blipFill>
+          <a:blip r:embed="rId8"/>
+          <a:stretch>
+            <a:fillRect/>
+          </a:stretch>
+        </p:blipFill>
+        <p:spPr>
+          <a:xfrm>
+            <a:off x="4174759" y="2665935"/>
+            <a:ext cx="810498" cy="810498"/>
+          </a:xfrm>
+          <a:prstGeom prst="rect">
+            <a:avLst/>
+          </a:prstGeom>
+          <a:ln w="12700">
+            <a:miter lim="400000"/>
+          </a:ln>
+        </p:spPr>
+      </p:pic>
+      <p:pic>
+        <p:nvPicPr>
+          <p:cNvPr id="61" name="kisspng-database-ico-icon-database-icons-5a76f02a410241.1734604215177441702663.png" descr="kisspng-database-ico-icon-database-icons-5a76f02a410241.1734604215177441702663.png">
+            <a:extLst>
+              <a:ext uri="{FF2B5EF4-FFF2-40B4-BE49-F238E27FC236}">
+                <a16:creationId xmlns:a16="http://schemas.microsoft.com/office/drawing/2014/main" id="{67C9BDBB-5429-BC4C-B5BE-B62B0FE23A22}"/>
+              </a:ext>
+            </a:extLst>
+          </p:cNvPr>
+          <p:cNvPicPr>
+            <a:picLocks noChangeAspect="1"/>
+          </p:cNvPicPr>
+          <p:nvPr/>
+        </p:nvPicPr>
+        <p:blipFill>
+          <a:blip r:embed="rId8"/>
+          <a:stretch>
+            <a:fillRect/>
+          </a:stretch>
+        </p:blipFill>
+        <p:spPr>
+          <a:xfrm>
+            <a:off x="5000282" y="2665935"/>
+            <a:ext cx="810498" cy="810498"/>
+          </a:xfrm>
+          <a:prstGeom prst="rect">
+            <a:avLst/>
+          </a:prstGeom>
+          <a:ln w="12700">
+            <a:miter lim="400000"/>
+          </a:ln>
+        </p:spPr>
+      </p:pic>
+      <p:pic>
+        <p:nvPicPr>
+          <p:cNvPr id="63" name="kisspng-database-ico-icon-database-icons-5a76f02a410241.1734604215177441702663.png" descr="kisspng-database-ico-icon-database-icons-5a76f02a410241.1734604215177441702663.png">
+            <a:extLst>
+              <a:ext uri="{FF2B5EF4-FFF2-40B4-BE49-F238E27FC236}">
+                <a16:creationId xmlns:a16="http://schemas.microsoft.com/office/drawing/2014/main" id="{1884EE23-2C8D-4F4A-B46E-96A32E780ABC}"/>
+              </a:ext>
+            </a:extLst>
+          </p:cNvPr>
+          <p:cNvPicPr>
+            <a:picLocks noChangeAspect="1"/>
+          </p:cNvPicPr>
+          <p:nvPr/>
+        </p:nvPicPr>
+        <p:blipFill>
+          <a:blip r:embed="rId8"/>
+          <a:stretch>
+            <a:fillRect/>
+          </a:stretch>
+        </p:blipFill>
+        <p:spPr>
+          <a:xfrm>
+            <a:off x="5822427" y="2665935"/>
+            <a:ext cx="810498" cy="810498"/>
+          </a:xfrm>
+          <a:prstGeom prst="rect">
+            <a:avLst/>
+          </a:prstGeom>
+          <a:ln w="12700">
+            <a:miter lim="400000"/>
+          </a:ln>
+        </p:spPr>
+      </p:pic>
+      <p:pic>
+        <p:nvPicPr>
+          <p:cNvPr id="64" name="kisspng-database-ico-icon-database-icons-5a76f02a410241.1734604215177441702663.png" descr="kisspng-database-ico-icon-database-icons-5a76f02a410241.1734604215177441702663.png">
+            <a:extLst>
+              <a:ext uri="{FF2B5EF4-FFF2-40B4-BE49-F238E27FC236}">
+                <a16:creationId xmlns:a16="http://schemas.microsoft.com/office/drawing/2014/main" id="{D27023A2-BFA1-624E-BAD0-ADD141690407}"/>
+              </a:ext>
+            </a:extLst>
+          </p:cNvPr>
+          <p:cNvPicPr>
+            <a:picLocks noChangeAspect="1"/>
+          </p:cNvPicPr>
+          <p:nvPr/>
+        </p:nvPicPr>
+        <p:blipFill>
+          <a:blip r:embed="rId8"/>
+          <a:stretch>
+            <a:fillRect/>
+          </a:stretch>
+        </p:blipFill>
+        <p:spPr>
+          <a:xfrm>
+            <a:off x="6644572" y="2665935"/>
+            <a:ext cx="810498" cy="810498"/>
+          </a:xfrm>
+          <a:prstGeom prst="rect">
+            <a:avLst/>
+          </a:prstGeom>
+          <a:ln w="12700">
+            <a:miter lim="400000"/>
+          </a:ln>
+        </p:spPr>
+      </p:pic>
+      <p:cxnSp>
+        <p:nvCxnSpPr>
+          <p:cNvPr id="52" name="Straight Arrow Connector 51">
+            <a:extLst>
+              <a:ext uri="{FF2B5EF4-FFF2-40B4-BE49-F238E27FC236}">
+                <a16:creationId xmlns:a16="http://schemas.microsoft.com/office/drawing/2014/main" id="{85D06064-5B9A-714C-A343-BBB4A84B36B5}"/>
+              </a:ext>
+            </a:extLst>
+          </p:cNvPr>
+          <p:cNvCxnSpPr>
+            <a:cxnSpLocks/>
+          </p:cNvCxnSpPr>
+          <p:nvPr/>
+        </p:nvCxnSpPr>
+        <p:spPr>
+          <a:xfrm>
+            <a:off x="6309263" y="728228"/>
+            <a:ext cx="0" cy="627661"/>
+          </a:xfrm>
+          <a:prstGeom prst="straightConnector1">
+            <a:avLst/>
+          </a:prstGeom>
+          <a:noFill/>
+          <a:ln w="25400" cap="flat">
+            <a:solidFill>
+              <a:schemeClr val="accent1"/>
+            </a:solidFill>
+            <a:prstDash val="solid"/>
+            <a:round/>
+            <a:tailEnd type="triangle"/>
+          </a:ln>
+          <a:effectLst>
+            <a:outerShdw blurRad="38100" dist="20000" dir="5400000" rotWithShape="0">
+              <a:srgbClr val="000000">
+                <a:alpha val="38000"/>
+              </a:srgbClr>
+            </a:outerShdw>
+          </a:effectLst>
+          <a:sp3d/>
+        </p:spPr>
+        <p:style>
+          <a:lnRef idx="0">
+            <a:scrgbClr r="0" g="0" b="0"/>
+          </a:lnRef>
+          <a:fillRef idx="0">
+            <a:scrgbClr r="0" g="0" b="0"/>
+          </a:fillRef>
+          <a:effectRef idx="0">
+            <a:scrgbClr r="0" g="0" b="0"/>
+          </a:effectRef>
+          <a:fontRef idx="none"/>
+        </p:style>
+      </p:cxnSp>
+      <p:cxnSp>
+        <p:nvCxnSpPr>
+          <p:cNvPr id="53" name="Straight Arrow Connector 52">
+            <a:extLst>
+              <a:ext uri="{FF2B5EF4-FFF2-40B4-BE49-F238E27FC236}">
+                <a16:creationId xmlns:a16="http://schemas.microsoft.com/office/drawing/2014/main" id="{1EB3714C-07BE-6F42-8AE2-D1448C957680}"/>
+              </a:ext>
+            </a:extLst>
+          </p:cNvPr>
+          <p:cNvCxnSpPr>
+            <a:cxnSpLocks/>
+          </p:cNvCxnSpPr>
+          <p:nvPr/>
+        </p:nvCxnSpPr>
+        <p:spPr>
+          <a:xfrm flipV="1">
+            <a:off x="6515656" y="721165"/>
+            <a:ext cx="0" cy="631414"/>
+          </a:xfrm>
+          <a:prstGeom prst="straightConnector1">
+            <a:avLst/>
+          </a:prstGeom>
+          <a:noFill/>
+          <a:ln w="25400" cap="flat">
+            <a:solidFill>
+              <a:schemeClr val="accent1"/>
+            </a:solidFill>
+            <a:prstDash val="solid"/>
+            <a:round/>
+            <a:tailEnd type="triangle"/>
+          </a:ln>
+          <a:effectLst>
+            <a:outerShdw blurRad="38100" dist="20000" dir="5400000" rotWithShape="0">
+              <a:srgbClr val="000000">
+                <a:alpha val="38000"/>
+              </a:srgbClr>
+            </a:outerShdw>
+          </a:effectLst>
+          <a:sp3d/>
+        </p:spPr>
+        <p:style>
+          <a:lnRef idx="0">
+            <a:scrgbClr r="0" g="0" b="0"/>
+          </a:lnRef>
+          <a:fillRef idx="0">
+            <a:scrgbClr r="0" g="0" b="0"/>
+          </a:fillRef>
+          <a:effectRef idx="0">
+            <a:scrgbClr r="0" g="0" b="0"/>
+          </a:effectRef>
+          <a:fontRef idx="none"/>
+        </p:style>
+      </p:cxnSp>
+      <p:sp>
+        <p:nvSpPr>
+          <p:cNvPr id="35" name="Rectangle 34">
+            <a:extLst>
+              <a:ext uri="{FF2B5EF4-FFF2-40B4-BE49-F238E27FC236}">
+                <a16:creationId xmlns:a16="http://schemas.microsoft.com/office/drawing/2014/main" id="{0FC7D450-B1E9-8D43-BE55-C571EC10C874}"/>
+              </a:ext>
+            </a:extLst>
+          </p:cNvPr>
+          <p:cNvSpPr/>
+          <p:nvPr/>
+        </p:nvSpPr>
+        <p:spPr>
+          <a:xfrm>
+            <a:off x="5925298" y="532955"/>
+            <a:ext cx="754629" cy="184197"/>
+          </a:xfrm>
+          <a:prstGeom prst="rect">
+            <a:avLst/>
+          </a:prstGeom>
+          <a:solidFill>
+            <a:srgbClr val="70AD47">
+              <a:lumMod val="75000"/>
+            </a:srgbClr>
+          </a:solidFill>
+          <a:ln w="12700" cap="flat" cmpd="sng" algn="ctr">
+            <a:solidFill>
+              <a:srgbClr val="5B9BD5">
+                <a:shade val="50000"/>
+              </a:srgbClr>
+            </a:solidFill>
+            <a:prstDash val="solid"/>
+            <a:miter lim="800000"/>
+          </a:ln>
+          <a:effectLst/>
+        </p:spPr>
+        <p:txBody>
+          <a:bodyPr rtlCol="0" anchor="ctr"/>
+          <a:lstStyle/>
+          <a:p>
+            <a:pPr algn="ctr" defTabSz="914400">
+              <a:defRPr/>
+            </a:pPr>
+            <a:r>
+              <a:rPr lang="en-US" sz="1100" kern="0" dirty="0">
+                <a:solidFill>
+                  <a:prstClr val="white"/>
+                </a:solidFill>
+                <a:latin typeface="Calibri" panose="020F0502020204030204"/>
+              </a:rPr>
+              <a:t>OpenCV</a:t>
+            </a:r>
+          </a:p>
+        </p:txBody>
+      </p:sp>
+      <p:sp>
+        <p:nvSpPr>
+          <p:cNvPr id="36" name="Rectangle 35">
+            <a:extLst>
+              <a:ext uri="{FF2B5EF4-FFF2-40B4-BE49-F238E27FC236}">
+                <a16:creationId xmlns:a16="http://schemas.microsoft.com/office/drawing/2014/main" id="{EBE1E7B4-4DD9-0C44-97AC-BB717A89DF2D}"/>
+              </a:ext>
+            </a:extLst>
+          </p:cNvPr>
+          <p:cNvSpPr/>
+          <p:nvPr/>
+        </p:nvSpPr>
+        <p:spPr>
+          <a:xfrm>
+            <a:off x="1003760" y="90328"/>
+            <a:ext cx="1838381" cy="627661"/>
+          </a:xfrm>
+          <a:prstGeom prst="rect">
+            <a:avLst/>
+          </a:prstGeom>
+          <a:solidFill>
+            <a:schemeClr val="accent1"/>
+          </a:solidFill>
+          <a:ln w="12700" cap="flat" cmpd="sng" algn="ctr">
+            <a:solidFill>
+              <a:srgbClr val="5B9BD5">
+                <a:shade val="50000"/>
+              </a:srgbClr>
+            </a:solidFill>
+            <a:prstDash val="solid"/>
+            <a:miter lim="800000"/>
+          </a:ln>
+          <a:effectLst/>
+        </p:spPr>
+        <p:txBody>
+          <a:bodyPr rtlCol="0" anchor="ctr"/>
+          <a:lstStyle/>
+          <a:p>
+            <a:pPr algn="ctr" defTabSz="1157114">
+              <a:defRPr/>
+            </a:pPr>
+            <a:r>
+              <a:rPr lang="en-US" sz="1519" kern="0" dirty="0">
+                <a:solidFill>
+                  <a:prstClr val="white"/>
+                </a:solidFill>
+                <a:latin typeface="Calibri" panose="020F0502020204030204"/>
+              </a:rPr>
+              <a:t>Client Application</a:t>
+            </a:r>
+          </a:p>
+        </p:txBody>
+      </p:sp>
+      <p:pic>
+        <p:nvPicPr>
+          <p:cNvPr id="3" name="Picture 2">
+            <a:extLst>
+              <a:ext uri="{FF2B5EF4-FFF2-40B4-BE49-F238E27FC236}">
+                <a16:creationId xmlns:a16="http://schemas.microsoft.com/office/drawing/2014/main" id="{8C938E72-FDB5-FA4C-A880-AB2A64609189}"/>
+              </a:ext>
+            </a:extLst>
+          </p:cNvPr>
+          <p:cNvPicPr>
+            <a:picLocks noChangeAspect="1"/>
+          </p:cNvPicPr>
+          <p:nvPr/>
+        </p:nvPicPr>
+        <p:blipFill>
+          <a:blip r:embed="rId9"/>
+          <a:stretch>
+            <a:fillRect/>
+          </a:stretch>
+        </p:blipFill>
+        <p:spPr>
+          <a:xfrm>
+            <a:off x="4068138" y="1581940"/>
+            <a:ext cx="865938" cy="757695"/>
+          </a:xfrm>
+          <a:prstGeom prst="rect">
+            <a:avLst/>
+          </a:prstGeom>
+        </p:spPr>
+      </p:pic>
+      <p:sp>
+        <p:nvSpPr>
+          <p:cNvPr id="43" name="Rectangle 42">
+            <a:extLst>
+              <a:ext uri="{FF2B5EF4-FFF2-40B4-BE49-F238E27FC236}">
+                <a16:creationId xmlns:a16="http://schemas.microsoft.com/office/drawing/2014/main" id="{F4D6F2A0-D7A3-4444-952B-9AD0F495C239}"/>
+              </a:ext>
+            </a:extLst>
+          </p:cNvPr>
+          <p:cNvSpPr/>
+          <p:nvPr/>
+        </p:nvSpPr>
+        <p:spPr>
+          <a:xfrm>
+            <a:off x="4798235" y="1853416"/>
+            <a:ext cx="397674" cy="267637"/>
+          </a:xfrm>
+          <a:prstGeom prst="rect">
+            <a:avLst/>
+          </a:prstGeom>
+        </p:spPr>
+        <p:txBody>
+          <a:bodyPr wrap="square">
+            <a:spAutoFit/>
+          </a:bodyPr>
+          <a:lstStyle/>
+          <a:p>
+            <a:r>
+              <a:rPr lang="en-US" sz="1139" dirty="0"/>
+              <a:t>OR</a:t>
+            </a:r>
+          </a:p>
+        </p:txBody>
+      </p:sp>
+    </p:spTree>
+    <p:extLst>
+      <p:ext uri="{BB962C8B-B14F-4D97-AF65-F5344CB8AC3E}">
+        <p14:creationId xmlns:p14="http://schemas.microsoft.com/office/powerpoint/2010/main" val="1469056238"/>
       </p:ext>
     </p:extLst>
   </p:cSld>

</xml_diff>

<commit_message>
Update comparison systems figures
</commit_message>
<xml_diff>
--- a/yfcc100m/paper/figures/comparison_system.pptx
+++ b/yfcc100m/paper/figures/comparison_system.pptx
@@ -244,7 +244,7 @@
           <a:p>
             <a:fld id="{FC088DA2-E2B4-0147-A2CD-628931F110B8}" type="datetimeFigureOut">
               <a:rPr lang="en-US" smtClean="0"/>
-              <a:t>2/16/21</a:t>
+              <a:t>2/22/21</a:t>
             </a:fld>
             <a:endParaRPr lang="en-US"/>
           </a:p>
@@ -414,7 +414,7 @@
           <a:p>
             <a:fld id="{FC088DA2-E2B4-0147-A2CD-628931F110B8}" type="datetimeFigureOut">
               <a:rPr lang="en-US" smtClean="0"/>
-              <a:t>2/16/21</a:t>
+              <a:t>2/22/21</a:t>
             </a:fld>
             <a:endParaRPr lang="en-US"/>
           </a:p>
@@ -594,7 +594,7 @@
           <a:p>
             <a:fld id="{FC088DA2-E2B4-0147-A2CD-628931F110B8}" type="datetimeFigureOut">
               <a:rPr lang="en-US" smtClean="0"/>
-              <a:t>2/16/21</a:t>
+              <a:t>2/22/21</a:t>
             </a:fld>
             <a:endParaRPr lang="en-US"/>
           </a:p>
@@ -952,7 +952,7 @@
           <a:p>
             <a:fld id="{FC088DA2-E2B4-0147-A2CD-628931F110B8}" type="datetimeFigureOut">
               <a:rPr lang="en-US" smtClean="0"/>
-              <a:t>2/16/21</a:t>
+              <a:t>2/22/21</a:t>
             </a:fld>
             <a:endParaRPr lang="en-US"/>
           </a:p>
@@ -1198,7 +1198,7 @@
           <a:p>
             <a:fld id="{FC088DA2-E2B4-0147-A2CD-628931F110B8}" type="datetimeFigureOut">
               <a:rPr lang="en-US" smtClean="0"/>
-              <a:t>2/16/21</a:t>
+              <a:t>2/22/21</a:t>
             </a:fld>
             <a:endParaRPr lang="en-US"/>
           </a:p>
@@ -1430,7 +1430,7 @@
           <a:p>
             <a:fld id="{FC088DA2-E2B4-0147-A2CD-628931F110B8}" type="datetimeFigureOut">
               <a:rPr lang="en-US" smtClean="0"/>
-              <a:t>2/16/21</a:t>
+              <a:t>2/22/21</a:t>
             </a:fld>
             <a:endParaRPr lang="en-US"/>
           </a:p>
@@ -1797,7 +1797,7 @@
           <a:p>
             <a:fld id="{FC088DA2-E2B4-0147-A2CD-628931F110B8}" type="datetimeFigureOut">
               <a:rPr lang="en-US" smtClean="0"/>
-              <a:t>2/16/21</a:t>
+              <a:t>2/22/21</a:t>
             </a:fld>
             <a:endParaRPr lang="en-US"/>
           </a:p>
@@ -1915,7 +1915,7 @@
           <a:p>
             <a:fld id="{FC088DA2-E2B4-0147-A2CD-628931F110B8}" type="datetimeFigureOut">
               <a:rPr lang="en-US" smtClean="0"/>
-              <a:t>2/16/21</a:t>
+              <a:t>2/22/21</a:t>
             </a:fld>
             <a:endParaRPr lang="en-US"/>
           </a:p>
@@ -2010,7 +2010,7 @@
           <a:p>
             <a:fld id="{FC088DA2-E2B4-0147-A2CD-628931F110B8}" type="datetimeFigureOut">
               <a:rPr lang="en-US" smtClean="0"/>
-              <a:t>2/16/21</a:t>
+              <a:t>2/22/21</a:t>
             </a:fld>
             <a:endParaRPr lang="en-US"/>
           </a:p>
@@ -2287,7 +2287,7 @@
           <a:p>
             <a:fld id="{FC088DA2-E2B4-0147-A2CD-628931F110B8}" type="datetimeFigureOut">
               <a:rPr lang="en-US" smtClean="0"/>
-              <a:t>2/16/21</a:t>
+              <a:t>2/22/21</a:t>
             </a:fld>
             <a:endParaRPr lang="en-US"/>
           </a:p>
@@ -2544,7 +2544,7 @@
           <a:p>
             <a:fld id="{FC088DA2-E2B4-0147-A2CD-628931F110B8}" type="datetimeFigureOut">
               <a:rPr lang="en-US" smtClean="0"/>
-              <a:t>2/16/21</a:t>
+              <a:t>2/22/21</a:t>
             </a:fld>
             <a:endParaRPr lang="en-US"/>
           </a:p>
@@ -2757,7 +2757,7 @@
           <a:p>
             <a:fld id="{FC088DA2-E2B4-0147-A2CD-628931F110B8}" type="datetimeFigureOut">
               <a:rPr lang="en-US" smtClean="0"/>
-              <a:t>2/16/21</a:t>
+              <a:t>2/22/21</a:t>
             </a:fld>
             <a:endParaRPr lang="en-US"/>
           </a:p>
@@ -4764,7 +4764,7 @@
         </p:nvSpPr>
         <p:spPr>
           <a:xfrm>
-            <a:off x="4133700" y="1352579"/>
+            <a:off x="4123794" y="1458515"/>
             <a:ext cx="1677080" cy="1261314"/>
           </a:xfrm>
           <a:prstGeom prst="rect">
@@ -4812,7 +4812,7 @@
         </p:nvSpPr>
         <p:spPr>
           <a:xfrm>
-            <a:off x="5866354" y="1353121"/>
+            <a:off x="5856448" y="1459057"/>
             <a:ext cx="1677080" cy="1260772"/>
           </a:xfrm>
           <a:prstGeom prst="rect">
@@ -4874,7 +4874,7 @@
         </p:blipFill>
         <p:spPr>
           <a:xfrm>
-            <a:off x="5932929" y="1646626"/>
+            <a:off x="5923023" y="1752562"/>
             <a:ext cx="1522441" cy="627661"/>
           </a:xfrm>
           <a:prstGeom prst="rect">
@@ -4898,7 +4898,7 @@
         </p:nvCxnSpPr>
         <p:spPr>
           <a:xfrm>
-            <a:off x="1737522" y="725049"/>
+            <a:off x="1727616" y="830985"/>
             <a:ext cx="0" cy="618766"/>
           </a:xfrm>
           <a:prstGeom prst="straightConnector1">
@@ -4951,7 +4951,7 @@
         </p:nvCxnSpPr>
         <p:spPr>
           <a:xfrm flipV="1">
-            <a:off x="2086711" y="717989"/>
+            <a:off x="2076805" y="823925"/>
             <a:ext cx="0" cy="618766"/>
           </a:xfrm>
           <a:prstGeom prst="straightConnector1">
@@ -5002,7 +5002,7 @@
         </p:nvSpPr>
         <p:spPr>
           <a:xfrm>
-            <a:off x="4864464" y="90397"/>
+            <a:off x="4854558" y="196333"/>
             <a:ext cx="1838381" cy="627661"/>
           </a:xfrm>
           <a:prstGeom prst="rect">
@@ -5057,7 +5057,7 @@
         </p:nvCxnSpPr>
         <p:spPr>
           <a:xfrm>
-            <a:off x="5188488" y="725053"/>
+            <a:off x="5178582" y="830989"/>
             <a:ext cx="0" cy="627661"/>
           </a:xfrm>
           <a:prstGeom prst="straightConnector1">
@@ -5110,7 +5110,7 @@
         </p:nvCxnSpPr>
         <p:spPr>
           <a:xfrm flipV="1">
-            <a:off x="5394881" y="717990"/>
+            <a:off x="5384975" y="823926"/>
             <a:ext cx="0" cy="631414"/>
           </a:xfrm>
           <a:prstGeom prst="straightConnector1">
@@ -5161,7 +5161,7 @@
         </p:nvSpPr>
         <p:spPr>
           <a:xfrm>
-            <a:off x="5375221" y="893557"/>
+            <a:off x="5365315" y="999493"/>
             <a:ext cx="769786" cy="267637"/>
           </a:xfrm>
           <a:prstGeom prst="rect">
@@ -5195,7 +5195,7 @@
         </p:nvSpPr>
         <p:spPr>
           <a:xfrm>
-            <a:off x="6561973" y="909079"/>
+            <a:off x="6552067" y="1015015"/>
             <a:ext cx="711930" cy="267637"/>
           </a:xfrm>
           <a:prstGeom prst="rect">
@@ -5229,7 +5229,7 @@
         </p:nvSpPr>
         <p:spPr>
           <a:xfrm>
-            <a:off x="2125015" y="805901"/>
+            <a:off x="2115109" y="911837"/>
             <a:ext cx="921353" cy="442942"/>
           </a:xfrm>
           <a:prstGeom prst="rect">
@@ -5283,7 +5283,7 @@
         </p:blipFill>
         <p:spPr>
           <a:xfrm>
-            <a:off x="5118732" y="1906130"/>
+            <a:off x="5108826" y="2012066"/>
             <a:ext cx="629541" cy="324214"/>
           </a:xfrm>
           <a:prstGeom prst="rect">
@@ -5308,7 +5308,7 @@
         </p:nvSpPr>
         <p:spPr>
           <a:xfrm>
-            <a:off x="196250" y="2395035"/>
+            <a:off x="186344" y="2500971"/>
             <a:ext cx="1236897" cy="218858"/>
           </a:xfrm>
           <a:prstGeom prst="rect">
@@ -5383,7 +5383,7 @@
         </p:blipFill>
         <p:spPr>
           <a:xfrm>
-            <a:off x="1179352" y="1639704"/>
+            <a:off x="1169446" y="1745640"/>
             <a:ext cx="573962" cy="480076"/>
           </a:xfrm>
           <a:prstGeom prst="rect">
@@ -5405,7 +5405,7 @@
         </p:nvSpPr>
         <p:spPr>
           <a:xfrm>
-            <a:off x="2733266" y="2171825"/>
+            <a:off x="2723360" y="2277761"/>
             <a:ext cx="1177459" cy="442073"/>
           </a:xfrm>
           <a:prstGeom prst="rect">
@@ -5474,7 +5474,7 @@
         </p:nvSpPr>
         <p:spPr>
           <a:xfrm>
-            <a:off x="1464759" y="2395035"/>
+            <a:off x="1454853" y="2500971"/>
             <a:ext cx="1236897" cy="218858"/>
           </a:xfrm>
           <a:prstGeom prst="rect">
@@ -5550,7 +5550,7 @@
         </p:blipFill>
         <p:spPr>
           <a:xfrm>
-            <a:off x="2006116" y="1639704"/>
+            <a:off x="1996210" y="1745640"/>
             <a:ext cx="570396" cy="480076"/>
           </a:xfrm>
           <a:prstGeom prst="rect">
@@ -5593,7 +5593,7 @@
         </p:blipFill>
         <p:spPr>
           <a:xfrm>
-            <a:off x="3061438" y="1628274"/>
+            <a:off x="3051532" y="1734210"/>
             <a:ext cx="434256" cy="480076"/>
           </a:xfrm>
           <a:prstGeom prst="rect">
@@ -5635,7 +5635,7 @@
         </p:blipFill>
         <p:spPr>
           <a:xfrm>
-            <a:off x="435539" y="1639704"/>
+            <a:off x="425633" y="1745640"/>
             <a:ext cx="491015" cy="480076"/>
           </a:xfrm>
           <a:prstGeom prst="rect">
@@ -5657,7 +5657,7 @@
         </p:nvSpPr>
         <p:spPr>
           <a:xfrm>
-            <a:off x="188103" y="1331253"/>
+            <a:off x="178197" y="1437189"/>
             <a:ext cx="3708003" cy="250687"/>
           </a:xfrm>
           <a:prstGeom prst="rect">
@@ -5712,7 +5712,7 @@
         </p:nvSpPr>
         <p:spPr>
           <a:xfrm>
-            <a:off x="196250" y="2171821"/>
+            <a:off x="186344" y="2277757"/>
             <a:ext cx="2505405" cy="198962"/>
           </a:xfrm>
           <a:prstGeom prst="rect">
@@ -5753,270 +5753,6 @@
           </a:p>
         </p:txBody>
       </p:sp>
-      <p:pic>
-        <p:nvPicPr>
-          <p:cNvPr id="56" name="kisspng-database-ico-icon-database-icons-5a76f02a410241.1734604215177441702663.png" descr="kisspng-database-ico-icon-database-icons-5a76f02a410241.1734604215177441702663.png">
-            <a:extLst>
-              <a:ext uri="{FF2B5EF4-FFF2-40B4-BE49-F238E27FC236}">
-                <a16:creationId xmlns:a16="http://schemas.microsoft.com/office/drawing/2014/main" id="{4EA3919F-3FBA-694D-893C-977B9BA84F7E}"/>
-              </a:ext>
-            </a:extLst>
-          </p:cNvPr>
-          <p:cNvPicPr>
-            <a:picLocks noChangeAspect="1"/>
-          </p:cNvPicPr>
-          <p:nvPr/>
-        </p:nvPicPr>
-        <p:blipFill>
-          <a:blip r:embed="rId8"/>
-          <a:stretch>
-            <a:fillRect/>
-          </a:stretch>
-        </p:blipFill>
-        <p:spPr>
-          <a:xfrm>
-            <a:off x="435535" y="2665935"/>
-            <a:ext cx="810498" cy="810498"/>
-          </a:xfrm>
-          <a:prstGeom prst="rect">
-            <a:avLst/>
-          </a:prstGeom>
-          <a:ln w="12700">
-            <a:miter lim="400000"/>
-          </a:ln>
-        </p:spPr>
-      </p:pic>
-      <p:pic>
-        <p:nvPicPr>
-          <p:cNvPr id="57" name="kisspng-database-ico-icon-database-icons-5a76f02a410241.1734604215177441702663.png" descr="kisspng-database-ico-icon-database-icons-5a76f02a410241.1734604215177441702663.png">
-            <a:extLst>
-              <a:ext uri="{FF2B5EF4-FFF2-40B4-BE49-F238E27FC236}">
-                <a16:creationId xmlns:a16="http://schemas.microsoft.com/office/drawing/2014/main" id="{3137EBC0-15CD-4543-99D2-C29E35EC24D8}"/>
-              </a:ext>
-            </a:extLst>
-          </p:cNvPr>
-          <p:cNvPicPr>
-            <a:picLocks noChangeAspect="1"/>
-          </p:cNvPicPr>
-          <p:nvPr/>
-        </p:nvPicPr>
-        <p:blipFill>
-          <a:blip r:embed="rId8"/>
-          <a:stretch>
-            <a:fillRect/>
-          </a:stretch>
-        </p:blipFill>
-        <p:spPr>
-          <a:xfrm>
-            <a:off x="1261058" y="2665935"/>
-            <a:ext cx="810498" cy="810498"/>
-          </a:xfrm>
-          <a:prstGeom prst="rect">
-            <a:avLst/>
-          </a:prstGeom>
-          <a:ln w="12700">
-            <a:miter lim="400000"/>
-          </a:ln>
-        </p:spPr>
-      </p:pic>
-      <p:pic>
-        <p:nvPicPr>
-          <p:cNvPr id="58" name="kisspng-database-ico-icon-database-icons-5a76f02a410241.1734604215177441702663.png" descr="kisspng-database-ico-icon-database-icons-5a76f02a410241.1734604215177441702663.png">
-            <a:extLst>
-              <a:ext uri="{FF2B5EF4-FFF2-40B4-BE49-F238E27FC236}">
-                <a16:creationId xmlns:a16="http://schemas.microsoft.com/office/drawing/2014/main" id="{8D6E0A2A-73C2-7449-8309-ED607C595676}"/>
-              </a:ext>
-            </a:extLst>
-          </p:cNvPr>
-          <p:cNvPicPr>
-            <a:picLocks noChangeAspect="1"/>
-          </p:cNvPicPr>
-          <p:nvPr/>
-        </p:nvPicPr>
-        <p:blipFill>
-          <a:blip r:embed="rId8"/>
-          <a:stretch>
-            <a:fillRect/>
-          </a:stretch>
-        </p:blipFill>
-        <p:spPr>
-          <a:xfrm>
-            <a:off x="2083203" y="2665935"/>
-            <a:ext cx="810498" cy="810498"/>
-          </a:xfrm>
-          <a:prstGeom prst="rect">
-            <a:avLst/>
-          </a:prstGeom>
-          <a:ln w="12700">
-            <a:miter lim="400000"/>
-          </a:ln>
-        </p:spPr>
-      </p:pic>
-      <p:pic>
-        <p:nvPicPr>
-          <p:cNvPr id="59" name="kisspng-database-ico-icon-database-icons-5a76f02a410241.1734604215177441702663.png" descr="kisspng-database-ico-icon-database-icons-5a76f02a410241.1734604215177441702663.png">
-            <a:extLst>
-              <a:ext uri="{FF2B5EF4-FFF2-40B4-BE49-F238E27FC236}">
-                <a16:creationId xmlns:a16="http://schemas.microsoft.com/office/drawing/2014/main" id="{64E41AEA-C66A-9743-A624-67ABBA69F47C}"/>
-              </a:ext>
-            </a:extLst>
-          </p:cNvPr>
-          <p:cNvPicPr>
-            <a:picLocks noChangeAspect="1"/>
-          </p:cNvPicPr>
-          <p:nvPr/>
-        </p:nvPicPr>
-        <p:blipFill>
-          <a:blip r:embed="rId8"/>
-          <a:stretch>
-            <a:fillRect/>
-          </a:stretch>
-        </p:blipFill>
-        <p:spPr>
-          <a:xfrm>
-            <a:off x="2905348" y="2665935"/>
-            <a:ext cx="810498" cy="810498"/>
-          </a:xfrm>
-          <a:prstGeom prst="rect">
-            <a:avLst/>
-          </a:prstGeom>
-          <a:ln w="12700">
-            <a:miter lim="400000"/>
-          </a:ln>
-        </p:spPr>
-      </p:pic>
-      <p:pic>
-        <p:nvPicPr>
-          <p:cNvPr id="60" name="kisspng-database-ico-icon-database-icons-5a76f02a410241.1734604215177441702663.png" descr="kisspng-database-ico-icon-database-icons-5a76f02a410241.1734604215177441702663.png">
-            <a:extLst>
-              <a:ext uri="{FF2B5EF4-FFF2-40B4-BE49-F238E27FC236}">
-                <a16:creationId xmlns:a16="http://schemas.microsoft.com/office/drawing/2014/main" id="{75684B21-A4B8-2F45-AE0C-BC15137106D7}"/>
-              </a:ext>
-            </a:extLst>
-          </p:cNvPr>
-          <p:cNvPicPr>
-            <a:picLocks noChangeAspect="1"/>
-          </p:cNvPicPr>
-          <p:nvPr/>
-        </p:nvPicPr>
-        <p:blipFill>
-          <a:blip r:embed="rId8"/>
-          <a:stretch>
-            <a:fillRect/>
-          </a:stretch>
-        </p:blipFill>
-        <p:spPr>
-          <a:xfrm>
-            <a:off x="4174759" y="2665935"/>
-            <a:ext cx="810498" cy="810498"/>
-          </a:xfrm>
-          <a:prstGeom prst="rect">
-            <a:avLst/>
-          </a:prstGeom>
-          <a:ln w="12700">
-            <a:miter lim="400000"/>
-          </a:ln>
-        </p:spPr>
-      </p:pic>
-      <p:pic>
-        <p:nvPicPr>
-          <p:cNvPr id="61" name="kisspng-database-ico-icon-database-icons-5a76f02a410241.1734604215177441702663.png" descr="kisspng-database-ico-icon-database-icons-5a76f02a410241.1734604215177441702663.png">
-            <a:extLst>
-              <a:ext uri="{FF2B5EF4-FFF2-40B4-BE49-F238E27FC236}">
-                <a16:creationId xmlns:a16="http://schemas.microsoft.com/office/drawing/2014/main" id="{67C9BDBB-5429-BC4C-B5BE-B62B0FE23A22}"/>
-              </a:ext>
-            </a:extLst>
-          </p:cNvPr>
-          <p:cNvPicPr>
-            <a:picLocks noChangeAspect="1"/>
-          </p:cNvPicPr>
-          <p:nvPr/>
-        </p:nvPicPr>
-        <p:blipFill>
-          <a:blip r:embed="rId8"/>
-          <a:stretch>
-            <a:fillRect/>
-          </a:stretch>
-        </p:blipFill>
-        <p:spPr>
-          <a:xfrm>
-            <a:off x="5000282" y="2665935"/>
-            <a:ext cx="810498" cy="810498"/>
-          </a:xfrm>
-          <a:prstGeom prst="rect">
-            <a:avLst/>
-          </a:prstGeom>
-          <a:ln w="12700">
-            <a:miter lim="400000"/>
-          </a:ln>
-        </p:spPr>
-      </p:pic>
-      <p:pic>
-        <p:nvPicPr>
-          <p:cNvPr id="63" name="kisspng-database-ico-icon-database-icons-5a76f02a410241.1734604215177441702663.png" descr="kisspng-database-ico-icon-database-icons-5a76f02a410241.1734604215177441702663.png">
-            <a:extLst>
-              <a:ext uri="{FF2B5EF4-FFF2-40B4-BE49-F238E27FC236}">
-                <a16:creationId xmlns:a16="http://schemas.microsoft.com/office/drawing/2014/main" id="{1884EE23-2C8D-4F4A-B46E-96A32E780ABC}"/>
-              </a:ext>
-            </a:extLst>
-          </p:cNvPr>
-          <p:cNvPicPr>
-            <a:picLocks noChangeAspect="1"/>
-          </p:cNvPicPr>
-          <p:nvPr/>
-        </p:nvPicPr>
-        <p:blipFill>
-          <a:blip r:embed="rId8"/>
-          <a:stretch>
-            <a:fillRect/>
-          </a:stretch>
-        </p:blipFill>
-        <p:spPr>
-          <a:xfrm>
-            <a:off x="5822427" y="2665935"/>
-            <a:ext cx="810498" cy="810498"/>
-          </a:xfrm>
-          <a:prstGeom prst="rect">
-            <a:avLst/>
-          </a:prstGeom>
-          <a:ln w="12700">
-            <a:miter lim="400000"/>
-          </a:ln>
-        </p:spPr>
-      </p:pic>
-      <p:pic>
-        <p:nvPicPr>
-          <p:cNvPr id="64" name="kisspng-database-ico-icon-database-icons-5a76f02a410241.1734604215177441702663.png" descr="kisspng-database-ico-icon-database-icons-5a76f02a410241.1734604215177441702663.png">
-            <a:extLst>
-              <a:ext uri="{FF2B5EF4-FFF2-40B4-BE49-F238E27FC236}">
-                <a16:creationId xmlns:a16="http://schemas.microsoft.com/office/drawing/2014/main" id="{D27023A2-BFA1-624E-BAD0-ADD141690407}"/>
-              </a:ext>
-            </a:extLst>
-          </p:cNvPr>
-          <p:cNvPicPr>
-            <a:picLocks noChangeAspect="1"/>
-          </p:cNvPicPr>
-          <p:nvPr/>
-        </p:nvPicPr>
-        <p:blipFill>
-          <a:blip r:embed="rId8"/>
-          <a:stretch>
-            <a:fillRect/>
-          </a:stretch>
-        </p:blipFill>
-        <p:spPr>
-          <a:xfrm>
-            <a:off x="6644572" y="2665935"/>
-            <a:ext cx="810498" cy="810498"/>
-          </a:xfrm>
-          <a:prstGeom prst="rect">
-            <a:avLst/>
-          </a:prstGeom>
-          <a:ln w="12700">
-            <a:miter lim="400000"/>
-          </a:ln>
-        </p:spPr>
-      </p:pic>
       <p:cxnSp>
         <p:nvCxnSpPr>
           <p:cNvPr id="52" name="Straight Arrow Connector 51">
@@ -6033,7 +5769,7 @@
         </p:nvCxnSpPr>
         <p:spPr>
           <a:xfrm>
-            <a:off x="6309263" y="728228"/>
+            <a:off x="6299357" y="834164"/>
             <a:ext cx="0" cy="627661"/>
           </a:xfrm>
           <a:prstGeom prst="straightConnector1">
@@ -6086,7 +5822,7 @@
         </p:nvCxnSpPr>
         <p:spPr>
           <a:xfrm flipV="1">
-            <a:off x="6515656" y="721165"/>
+            <a:off x="6505750" y="827101"/>
             <a:ext cx="0" cy="631414"/>
           </a:xfrm>
           <a:prstGeom prst="straightConnector1">
@@ -6137,7 +5873,7 @@
         </p:nvSpPr>
         <p:spPr>
           <a:xfrm>
-            <a:off x="5925298" y="532955"/>
+            <a:off x="5915392" y="638891"/>
             <a:ext cx="754629" cy="184197"/>
           </a:xfrm>
           <a:prstGeom prst="rect">
@@ -6192,7 +5928,7 @@
         </p:nvSpPr>
         <p:spPr>
           <a:xfrm>
-            <a:off x="1003760" y="90328"/>
+            <a:off x="993854" y="196264"/>
             <a:ext cx="1838381" cy="627661"/>
           </a:xfrm>
           <a:prstGeom prst="rect">
@@ -6246,14 +5982,14 @@
           <p:nvPr/>
         </p:nvPicPr>
         <p:blipFill>
-          <a:blip r:embed="rId9"/>
+          <a:blip r:embed="rId8"/>
           <a:stretch>
             <a:fillRect/>
           </a:stretch>
         </p:blipFill>
         <p:spPr>
           <a:xfrm>
-            <a:off x="4068138" y="1581940"/>
+            <a:off x="4058232" y="1687876"/>
             <a:ext cx="865938" cy="757695"/>
           </a:xfrm>
           <a:prstGeom prst="rect">
@@ -6275,7 +6011,7 @@
         </p:nvSpPr>
         <p:spPr>
           <a:xfrm>
-            <a:off x="4798235" y="1853416"/>
+            <a:off x="4788329" y="1959352"/>
             <a:ext cx="397674" cy="267637"/>
           </a:xfrm>
           <a:prstGeom prst="rect">
@@ -6291,6 +6027,116 @@
             <a:r>
               <a:rPr lang="en-US" sz="1139" dirty="0"/>
               <a:t>OR</a:t>
+            </a:r>
+          </a:p>
+        </p:txBody>
+      </p:sp>
+      <p:sp>
+        <p:nvSpPr>
+          <p:cNvPr id="44" name="Rectangle 43">
+            <a:extLst>
+              <a:ext uri="{FF2B5EF4-FFF2-40B4-BE49-F238E27FC236}">
+                <a16:creationId xmlns:a16="http://schemas.microsoft.com/office/drawing/2014/main" id="{35AAFD86-D64C-504F-8402-B83AB9F1988B}"/>
+              </a:ext>
+            </a:extLst>
+          </p:cNvPr>
+          <p:cNvSpPr/>
+          <p:nvPr/>
+        </p:nvSpPr>
+        <p:spPr>
+          <a:xfrm>
+            <a:off x="186344" y="2815597"/>
+            <a:ext cx="3714475" cy="379227"/>
+          </a:xfrm>
+          <a:prstGeom prst="rect">
+            <a:avLst/>
+          </a:prstGeom>
+          <a:solidFill>
+            <a:srgbClr val="70AD47">
+              <a:lumMod val="75000"/>
+            </a:srgbClr>
+          </a:solidFill>
+          <a:ln w="12700" cap="flat" cmpd="sng" algn="ctr">
+            <a:solidFill>
+              <a:srgbClr val="5B9BD5">
+                <a:shade val="50000"/>
+              </a:srgbClr>
+            </a:solidFill>
+            <a:prstDash val="solid"/>
+            <a:miter lim="800000"/>
+          </a:ln>
+          <a:effectLst/>
+        </p:spPr>
+        <p:txBody>
+          <a:bodyPr lIns="0" rIns="0" rtlCol="0" anchor="ctr"/>
+          <a:lstStyle/>
+          <a:p>
+            <a:pPr algn="ctr" defTabSz="1219170">
+              <a:defRPr/>
+            </a:pPr>
+            <a:r>
+              <a:rPr lang="en-US" sz="1867" kern="0" dirty="0">
+                <a:solidFill>
+                  <a:prstClr val="white"/>
+                </a:solidFill>
+                <a:latin typeface="Calibri" panose="020F0502020204030204"/>
+              </a:rPr>
+              <a:t>EXT4 Filesystem over RAID5</a:t>
+            </a:r>
+          </a:p>
+        </p:txBody>
+      </p:sp>
+      <p:sp>
+        <p:nvSpPr>
+          <p:cNvPr id="45" name="Rectangle 44">
+            <a:extLst>
+              <a:ext uri="{FF2B5EF4-FFF2-40B4-BE49-F238E27FC236}">
+                <a16:creationId xmlns:a16="http://schemas.microsoft.com/office/drawing/2014/main" id="{68FA4A0D-C03A-B346-80D1-07D8D9A948D9}"/>
+              </a:ext>
+            </a:extLst>
+          </p:cNvPr>
+          <p:cNvSpPr/>
+          <p:nvPr/>
+        </p:nvSpPr>
+        <p:spPr>
+          <a:xfrm>
+            <a:off x="4123794" y="2820952"/>
+            <a:ext cx="3409734" cy="379227"/>
+          </a:xfrm>
+          <a:prstGeom prst="rect">
+            <a:avLst/>
+          </a:prstGeom>
+          <a:solidFill>
+            <a:srgbClr val="70AD47">
+              <a:lumMod val="75000"/>
+            </a:srgbClr>
+          </a:solidFill>
+          <a:ln w="12700" cap="flat" cmpd="sng" algn="ctr">
+            <a:solidFill>
+              <a:srgbClr val="5B9BD5">
+                <a:shade val="50000"/>
+              </a:srgbClr>
+            </a:solidFill>
+            <a:prstDash val="solid"/>
+            <a:miter lim="800000"/>
+          </a:ln>
+          <a:effectLst/>
+        </p:spPr>
+        <p:txBody>
+          <a:bodyPr lIns="0" rIns="0" rtlCol="0" anchor="ctr"/>
+          <a:lstStyle/>
+          <a:p>
+            <a:pPr algn="ctr" defTabSz="1219170">
+              <a:defRPr/>
+            </a:pPr>
+            <a:r>
+              <a:rPr lang="en-US" sz="1867" kern="0" dirty="0">
+                <a:solidFill>
+                  <a:prstClr val="white"/>
+                </a:solidFill>
+                <a:latin typeface="Calibri" panose="020F0502020204030204"/>
+              </a:rPr>
+              <a:t>EXT4 Filesystem over RAID5</a:t>
             </a:r>
           </a:p>
         </p:txBody>

</xml_diff>

<commit_message>
Update intro and design sections. Move appendix to eval.
</commit_message>
<xml_diff>
--- a/yfcc100m/paper/figures/comparison_system.pptx
+++ b/yfcc100m/paper/figures/comparison_system.pptx
@@ -7,6 +7,7 @@
   <p:sldIdLst>
     <p:sldId id="1464" r:id="rId2"/>
     <p:sldId id="1465" r:id="rId3"/>
+    <p:sldId id="1466" r:id="rId4"/>
   </p:sldIdLst>
   <p:sldSz cx="7772400" cy="3657600"/>
   <p:notesSz cx="6858000" cy="9144000"/>
@@ -244,7 +245,7 @@
           <a:p>
             <a:fld id="{FC088DA2-E2B4-0147-A2CD-628931F110B8}" type="datetimeFigureOut">
               <a:rPr lang="en-US" smtClean="0"/>
-              <a:t>2/22/21</a:t>
+              <a:t>2/25/21</a:t>
             </a:fld>
             <a:endParaRPr lang="en-US"/>
           </a:p>
@@ -414,7 +415,7 @@
           <a:p>
             <a:fld id="{FC088DA2-E2B4-0147-A2CD-628931F110B8}" type="datetimeFigureOut">
               <a:rPr lang="en-US" smtClean="0"/>
-              <a:t>2/22/21</a:t>
+              <a:t>2/25/21</a:t>
             </a:fld>
             <a:endParaRPr lang="en-US"/>
           </a:p>
@@ -594,7 +595,7 @@
           <a:p>
             <a:fld id="{FC088DA2-E2B4-0147-A2CD-628931F110B8}" type="datetimeFigureOut">
               <a:rPr lang="en-US" smtClean="0"/>
-              <a:t>2/22/21</a:t>
+              <a:t>2/25/21</a:t>
             </a:fld>
             <a:endParaRPr lang="en-US"/>
           </a:p>
@@ -952,7 +953,7 @@
           <a:p>
             <a:fld id="{FC088DA2-E2B4-0147-A2CD-628931F110B8}" type="datetimeFigureOut">
               <a:rPr lang="en-US" smtClean="0"/>
-              <a:t>2/22/21</a:t>
+              <a:t>2/25/21</a:t>
             </a:fld>
             <a:endParaRPr lang="en-US"/>
           </a:p>
@@ -1198,7 +1199,7 @@
           <a:p>
             <a:fld id="{FC088DA2-E2B4-0147-A2CD-628931F110B8}" type="datetimeFigureOut">
               <a:rPr lang="en-US" smtClean="0"/>
-              <a:t>2/22/21</a:t>
+              <a:t>2/25/21</a:t>
             </a:fld>
             <a:endParaRPr lang="en-US"/>
           </a:p>
@@ -1430,7 +1431,7 @@
           <a:p>
             <a:fld id="{FC088DA2-E2B4-0147-A2CD-628931F110B8}" type="datetimeFigureOut">
               <a:rPr lang="en-US" smtClean="0"/>
-              <a:t>2/22/21</a:t>
+              <a:t>2/25/21</a:t>
             </a:fld>
             <a:endParaRPr lang="en-US"/>
           </a:p>
@@ -1797,7 +1798,7 @@
           <a:p>
             <a:fld id="{FC088DA2-E2B4-0147-A2CD-628931F110B8}" type="datetimeFigureOut">
               <a:rPr lang="en-US" smtClean="0"/>
-              <a:t>2/22/21</a:t>
+              <a:t>2/25/21</a:t>
             </a:fld>
             <a:endParaRPr lang="en-US"/>
           </a:p>
@@ -1915,7 +1916,7 @@
           <a:p>
             <a:fld id="{FC088DA2-E2B4-0147-A2CD-628931F110B8}" type="datetimeFigureOut">
               <a:rPr lang="en-US" smtClean="0"/>
-              <a:t>2/22/21</a:t>
+              <a:t>2/25/21</a:t>
             </a:fld>
             <a:endParaRPr lang="en-US"/>
           </a:p>
@@ -2010,7 +2011,7 @@
           <a:p>
             <a:fld id="{FC088DA2-E2B4-0147-A2CD-628931F110B8}" type="datetimeFigureOut">
               <a:rPr lang="en-US" smtClean="0"/>
-              <a:t>2/22/21</a:t>
+              <a:t>2/25/21</a:t>
             </a:fld>
             <a:endParaRPr lang="en-US"/>
           </a:p>
@@ -2287,7 +2288,7 @@
           <a:p>
             <a:fld id="{FC088DA2-E2B4-0147-A2CD-628931F110B8}" type="datetimeFigureOut">
               <a:rPr lang="en-US" smtClean="0"/>
-              <a:t>2/22/21</a:t>
+              <a:t>2/25/21</a:t>
             </a:fld>
             <a:endParaRPr lang="en-US"/>
           </a:p>
@@ -2544,7 +2545,7 @@
           <a:p>
             <a:fld id="{FC088DA2-E2B4-0147-A2CD-628931F110B8}" type="datetimeFigureOut">
               <a:rPr lang="en-US" smtClean="0"/>
-              <a:t>2/22/21</a:t>
+              <a:t>2/25/21</a:t>
             </a:fld>
             <a:endParaRPr lang="en-US"/>
           </a:p>
@@ -2757,7 +2758,7 @@
           <a:p>
             <a:fld id="{FC088DA2-E2B4-0147-A2CD-628931F110B8}" type="datetimeFigureOut">
               <a:rPr lang="en-US" smtClean="0"/>
-              <a:t>2/22/21</a:t>
+              <a:t>2/25/21</a:t>
             </a:fld>
             <a:endParaRPr lang="en-US"/>
           </a:p>
@@ -6145,6 +6146,1864 @@
     <p:extLst>
       <p:ext uri="{BB962C8B-B14F-4D97-AF65-F5344CB8AC3E}">
         <p14:creationId xmlns:p14="http://schemas.microsoft.com/office/powerpoint/2010/main" val="1469056238"/>
+      </p:ext>
+    </p:extLst>
+  </p:cSld>
+  <p:clrMapOvr>
+    <a:masterClrMapping/>
+  </p:clrMapOvr>
+  <p:transition spd="med"/>
+  <p:timing>
+    <p:tnLst>
+      <p:par>
+        <p:cTn id="1" dur="indefinite" restart="never" nodeType="tmRoot">
+          <p:childTnLst>
+            <p:seq concurrent="1" nextAc="seek">
+              <p:cTn id="2" dur="indefinite" nodeType="mainSeq">
+                <p:childTnLst>
+                  <p:par>
+                    <p:cTn id="3" fill="hold">
+                      <p:stCondLst>
+                        <p:cond delay="indefinite"/>
+                      </p:stCondLst>
+                      <p:childTnLst>
+                        <p:par>
+                          <p:cTn id="4" fill="hold">
+                            <p:stCondLst>
+                              <p:cond delay="0"/>
+                            </p:stCondLst>
+                            <p:childTnLst>
+                              <p:par>
+                                <p:cTn id="5" presetID="1" presetClass="entr" presetSubtype="0" fill="hold" nodeType="clickEffect">
+                                  <p:stCondLst>
+                                    <p:cond delay="0"/>
+                                  </p:stCondLst>
+                                  <p:childTnLst>
+                                    <p:set>
+                                      <p:cBhvr>
+                                        <p:cTn id="6" dur="1" fill="hold">
+                                          <p:stCondLst>
+                                            <p:cond delay="0"/>
+                                          </p:stCondLst>
+                                        </p:cTn>
+                                        <p:tgtEl>
+                                          <p:spTgt spid="27"/>
+                                        </p:tgtEl>
+                                        <p:attrNameLst>
+                                          <p:attrName>style.visibility</p:attrName>
+                                        </p:attrNameLst>
+                                      </p:cBhvr>
+                                      <p:to>
+                                        <p:strVal val="visible"/>
+                                      </p:to>
+                                    </p:set>
+                                  </p:childTnLst>
+                                </p:cTn>
+                              </p:par>
+                            </p:childTnLst>
+                          </p:cTn>
+                        </p:par>
+                      </p:childTnLst>
+                    </p:cTn>
+                  </p:par>
+                </p:childTnLst>
+              </p:cTn>
+              <p:prevCondLst>
+                <p:cond evt="onPrev" delay="0">
+                  <p:tgtEl>
+                    <p:sldTgt/>
+                  </p:tgtEl>
+                </p:cond>
+              </p:prevCondLst>
+              <p:nextCondLst>
+                <p:cond evt="onNext" delay="0">
+                  <p:tgtEl>
+                    <p:sldTgt/>
+                  </p:tgtEl>
+                </p:cond>
+              </p:nextCondLst>
+            </p:seq>
+          </p:childTnLst>
+        </p:cTn>
+      </p:par>
+    </p:tnLst>
+  </p:timing>
+</p:sld>
+</file>
+
+<file path=ppt/slides/slide3.xml><?xml version="1.0" encoding="utf-8"?>
+<p:sld xmlns:a="http://schemas.openxmlformats.org/drawingml/2006/main" xmlns:r="http://schemas.openxmlformats.org/officeDocument/2006/relationships" xmlns:p="http://schemas.openxmlformats.org/presentationml/2006/main">
+  <p:cSld>
+    <p:spTree>
+      <p:nvGrpSpPr>
+        <p:cNvPr id="1" name=""/>
+        <p:cNvGrpSpPr/>
+        <p:nvPr/>
+      </p:nvGrpSpPr>
+      <p:grpSpPr>
+        <a:xfrm>
+          <a:off x="0" y="0"/>
+          <a:ext cx="0" cy="0"/>
+          <a:chOff x="0" y="0"/>
+          <a:chExt cx="0" cy="0"/>
+        </a:xfrm>
+      </p:grpSpPr>
+      <p:sp>
+        <p:nvSpPr>
+          <p:cNvPr id="67" name="Rectangle 66">
+            <a:extLst>
+              <a:ext uri="{FF2B5EF4-FFF2-40B4-BE49-F238E27FC236}">
+                <a16:creationId xmlns:a16="http://schemas.microsoft.com/office/drawing/2014/main" id="{FCF27F4F-7A19-444F-B766-EBBC70336111}"/>
+              </a:ext>
+            </a:extLst>
+          </p:cNvPr>
+          <p:cNvSpPr/>
+          <p:nvPr/>
+        </p:nvSpPr>
+        <p:spPr>
+          <a:xfrm>
+            <a:off x="2042220" y="1540229"/>
+            <a:ext cx="1454127" cy="1060121"/>
+          </a:xfrm>
+          <a:prstGeom prst="rect">
+            <a:avLst/>
+          </a:prstGeom>
+          <a:noFill/>
+          <a:ln w="12700" cap="flat" cmpd="sng" algn="ctr">
+            <a:solidFill>
+              <a:srgbClr val="5B9BD5">
+                <a:shade val="50000"/>
+              </a:srgbClr>
+            </a:solidFill>
+            <a:prstDash val="solid"/>
+            <a:miter lim="800000"/>
+          </a:ln>
+          <a:effectLst/>
+        </p:spPr>
+        <p:txBody>
+          <a:bodyPr rtlCol="0" anchor="ctr"/>
+          <a:lstStyle/>
+          <a:p>
+            <a:pPr algn="ctr" defTabSz="1157114">
+              <a:defRPr/>
+            </a:pPr>
+            <a:endParaRPr lang="en-US" sz="1519" kern="0" dirty="0">
+              <a:solidFill>
+                <a:prstClr val="white"/>
+              </a:solidFill>
+              <a:latin typeface="Calibri" panose="020F0502020204030204"/>
+            </a:endParaRPr>
+          </a:p>
+        </p:txBody>
+      </p:sp>
+      <p:pic>
+        <p:nvPicPr>
+          <p:cNvPr id="73" name="Picture 72">
+            <a:extLst>
+              <a:ext uri="{FF2B5EF4-FFF2-40B4-BE49-F238E27FC236}">
+                <a16:creationId xmlns:a16="http://schemas.microsoft.com/office/drawing/2014/main" id="{13D60420-0E9F-854C-A8F2-8ABED32217C1}"/>
+              </a:ext>
+            </a:extLst>
+          </p:cNvPr>
+          <p:cNvPicPr>
+            <a:picLocks noChangeAspect="1"/>
+          </p:cNvPicPr>
+          <p:nvPr/>
+        </p:nvPicPr>
+        <p:blipFill>
+          <a:blip r:embed="rId2">
+            <a:extLst>
+              <a:ext uri="{28A0092B-C50C-407E-A947-70E740481C1C}">
+                <a14:useLocalDpi xmlns:a14="http://schemas.microsoft.com/office/drawing/2010/main" val="0"/>
+              </a:ext>
+            </a:extLst>
+          </a:blip>
+          <a:stretch>
+            <a:fillRect/>
+          </a:stretch>
+        </p:blipFill>
+        <p:spPr>
+          <a:xfrm>
+            <a:off x="4044379" y="1818655"/>
+            <a:ext cx="1768993" cy="729308"/>
+          </a:xfrm>
+          <a:prstGeom prst="rect">
+            <a:avLst/>
+          </a:prstGeom>
+        </p:spPr>
+      </p:pic>
+      <p:cxnSp>
+        <p:nvCxnSpPr>
+          <p:cNvPr id="77" name="Straight Arrow Connector 76">
+            <a:extLst>
+              <a:ext uri="{FF2B5EF4-FFF2-40B4-BE49-F238E27FC236}">
+                <a16:creationId xmlns:a16="http://schemas.microsoft.com/office/drawing/2014/main" id="{A8ED9215-7D83-8248-939A-6BF718E34249}"/>
+              </a:ext>
+            </a:extLst>
+          </p:cNvPr>
+          <p:cNvCxnSpPr>
+            <a:cxnSpLocks/>
+          </p:cNvCxnSpPr>
+          <p:nvPr/>
+        </p:nvCxnSpPr>
+        <p:spPr>
+          <a:xfrm>
+            <a:off x="934558" y="886885"/>
+            <a:ext cx="0" cy="618766"/>
+          </a:xfrm>
+          <a:prstGeom prst="straightConnector1">
+            <a:avLst/>
+          </a:prstGeom>
+          <a:noFill/>
+          <a:ln w="25400" cap="flat">
+            <a:solidFill>
+              <a:schemeClr val="accent1"/>
+            </a:solidFill>
+            <a:prstDash val="solid"/>
+            <a:round/>
+            <a:tailEnd type="triangle"/>
+          </a:ln>
+          <a:effectLst>
+            <a:outerShdw blurRad="38100" dist="20000" dir="5400000" rotWithShape="0">
+              <a:srgbClr val="000000">
+                <a:alpha val="38000"/>
+              </a:srgbClr>
+            </a:outerShdw>
+          </a:effectLst>
+          <a:sp3d/>
+        </p:spPr>
+        <p:style>
+          <a:lnRef idx="0">
+            <a:scrgbClr r="0" g="0" b="0"/>
+          </a:lnRef>
+          <a:fillRef idx="0">
+            <a:scrgbClr r="0" g="0" b="0"/>
+          </a:fillRef>
+          <a:effectRef idx="0">
+            <a:scrgbClr r="0" g="0" b="0"/>
+          </a:effectRef>
+          <a:fontRef idx="none"/>
+        </p:style>
+      </p:cxnSp>
+      <p:cxnSp>
+        <p:nvCxnSpPr>
+          <p:cNvPr id="78" name="Straight Arrow Connector 77">
+            <a:extLst>
+              <a:ext uri="{FF2B5EF4-FFF2-40B4-BE49-F238E27FC236}">
+                <a16:creationId xmlns:a16="http://schemas.microsoft.com/office/drawing/2014/main" id="{D3A0E8EA-A5D2-EB4E-BE91-FC83090F1128}"/>
+              </a:ext>
+            </a:extLst>
+          </p:cNvPr>
+          <p:cNvCxnSpPr>
+            <a:cxnSpLocks/>
+          </p:cNvCxnSpPr>
+          <p:nvPr/>
+        </p:nvCxnSpPr>
+        <p:spPr>
+          <a:xfrm flipV="1">
+            <a:off x="1289284" y="886885"/>
+            <a:ext cx="0" cy="618766"/>
+          </a:xfrm>
+          <a:prstGeom prst="straightConnector1">
+            <a:avLst/>
+          </a:prstGeom>
+          <a:noFill/>
+          <a:ln w="25400" cap="flat">
+            <a:solidFill>
+              <a:schemeClr val="accent1"/>
+            </a:solidFill>
+            <a:prstDash val="solid"/>
+            <a:round/>
+            <a:tailEnd type="triangle"/>
+          </a:ln>
+          <a:effectLst>
+            <a:outerShdw blurRad="38100" dist="20000" dir="5400000" rotWithShape="0">
+              <a:srgbClr val="000000">
+                <a:alpha val="38000"/>
+              </a:srgbClr>
+            </a:outerShdw>
+          </a:effectLst>
+          <a:sp3d/>
+        </p:spPr>
+        <p:style>
+          <a:lnRef idx="0">
+            <a:scrgbClr r="0" g="0" b="0"/>
+          </a:lnRef>
+          <a:fillRef idx="0">
+            <a:scrgbClr r="0" g="0" b="0"/>
+          </a:fillRef>
+          <a:effectRef idx="0">
+            <a:scrgbClr r="0" g="0" b="0"/>
+          </a:effectRef>
+          <a:fontRef idx="none"/>
+        </p:style>
+      </p:cxnSp>
+      <p:cxnSp>
+        <p:nvCxnSpPr>
+          <p:cNvPr id="93" name="Straight Arrow Connector 92">
+            <a:extLst>
+              <a:ext uri="{FF2B5EF4-FFF2-40B4-BE49-F238E27FC236}">
+                <a16:creationId xmlns:a16="http://schemas.microsoft.com/office/drawing/2014/main" id="{8E044119-D61C-A64B-9B45-307C4FF36824}"/>
+              </a:ext>
+            </a:extLst>
+          </p:cNvPr>
+          <p:cNvCxnSpPr>
+            <a:cxnSpLocks/>
+          </p:cNvCxnSpPr>
+          <p:nvPr/>
+        </p:nvCxnSpPr>
+        <p:spPr>
+          <a:xfrm>
+            <a:off x="2914878" y="885987"/>
+            <a:ext cx="0" cy="627661"/>
+          </a:xfrm>
+          <a:prstGeom prst="straightConnector1">
+            <a:avLst/>
+          </a:prstGeom>
+          <a:noFill/>
+          <a:ln w="25400" cap="flat">
+            <a:solidFill>
+              <a:schemeClr val="accent1"/>
+            </a:solidFill>
+            <a:prstDash val="solid"/>
+            <a:round/>
+            <a:tailEnd type="triangle"/>
+          </a:ln>
+          <a:effectLst>
+            <a:outerShdw blurRad="38100" dist="20000" dir="5400000" rotWithShape="0">
+              <a:srgbClr val="000000">
+                <a:alpha val="38000"/>
+              </a:srgbClr>
+            </a:outerShdw>
+          </a:effectLst>
+          <a:sp3d/>
+        </p:spPr>
+        <p:style>
+          <a:lnRef idx="0">
+            <a:scrgbClr r="0" g="0" b="0"/>
+          </a:lnRef>
+          <a:fillRef idx="0">
+            <a:scrgbClr r="0" g="0" b="0"/>
+          </a:fillRef>
+          <a:effectRef idx="0">
+            <a:scrgbClr r="0" g="0" b="0"/>
+          </a:effectRef>
+          <a:fontRef idx="none"/>
+        </p:style>
+      </p:cxnSp>
+      <p:cxnSp>
+        <p:nvCxnSpPr>
+          <p:cNvPr id="94" name="Straight Arrow Connector 93">
+            <a:extLst>
+              <a:ext uri="{FF2B5EF4-FFF2-40B4-BE49-F238E27FC236}">
+                <a16:creationId xmlns:a16="http://schemas.microsoft.com/office/drawing/2014/main" id="{AB7ACE88-909B-6D49-8CE5-E3A3B5EDB1CE}"/>
+              </a:ext>
+            </a:extLst>
+          </p:cNvPr>
+          <p:cNvCxnSpPr>
+            <a:cxnSpLocks/>
+          </p:cNvCxnSpPr>
+          <p:nvPr/>
+        </p:nvCxnSpPr>
+        <p:spPr>
+          <a:xfrm flipV="1">
+            <a:off x="3121271" y="878924"/>
+            <a:ext cx="0" cy="631414"/>
+          </a:xfrm>
+          <a:prstGeom prst="straightConnector1">
+            <a:avLst/>
+          </a:prstGeom>
+          <a:noFill/>
+          <a:ln w="25400" cap="flat">
+            <a:solidFill>
+              <a:schemeClr val="accent1"/>
+            </a:solidFill>
+            <a:prstDash val="solid"/>
+            <a:round/>
+            <a:tailEnd type="triangle"/>
+          </a:ln>
+          <a:effectLst>
+            <a:outerShdw blurRad="38100" dist="20000" dir="5400000" rotWithShape="0">
+              <a:srgbClr val="000000">
+                <a:alpha val="38000"/>
+              </a:srgbClr>
+            </a:outerShdw>
+          </a:effectLst>
+          <a:sp3d/>
+        </p:spPr>
+        <p:style>
+          <a:lnRef idx="0">
+            <a:scrgbClr r="0" g="0" b="0"/>
+          </a:lnRef>
+          <a:fillRef idx="0">
+            <a:scrgbClr r="0" g="0" b="0"/>
+          </a:fillRef>
+          <a:effectRef idx="0">
+            <a:scrgbClr r="0" g="0" b="0"/>
+          </a:effectRef>
+          <a:fontRef idx="none"/>
+        </p:style>
+      </p:cxnSp>
+      <p:sp>
+        <p:nvSpPr>
+          <p:cNvPr id="96" name="Rectangle 95">
+            <a:extLst>
+              <a:ext uri="{FF2B5EF4-FFF2-40B4-BE49-F238E27FC236}">
+                <a16:creationId xmlns:a16="http://schemas.microsoft.com/office/drawing/2014/main" id="{BE3C1CE4-E686-F649-89F1-25FEA24B9922}"/>
+              </a:ext>
+            </a:extLst>
+          </p:cNvPr>
+          <p:cNvSpPr/>
+          <p:nvPr/>
+        </p:nvSpPr>
+        <p:spPr>
+          <a:xfrm>
+            <a:off x="3123915" y="1054491"/>
+            <a:ext cx="769786" cy="267637"/>
+          </a:xfrm>
+          <a:prstGeom prst="rect">
+            <a:avLst/>
+          </a:prstGeom>
+        </p:spPr>
+        <p:txBody>
+          <a:bodyPr wrap="square">
+            <a:spAutoFit/>
+          </a:bodyPr>
+          <a:lstStyle/>
+          <a:p>
+            <a:r>
+              <a:rPr lang="en-US" sz="1139" dirty="0"/>
+              <a:t>metadata</a:t>
+            </a:r>
+          </a:p>
+        </p:txBody>
+      </p:sp>
+      <p:sp>
+        <p:nvSpPr>
+          <p:cNvPr id="97" name="Rectangle 96">
+            <a:extLst>
+              <a:ext uri="{FF2B5EF4-FFF2-40B4-BE49-F238E27FC236}">
+                <a16:creationId xmlns:a16="http://schemas.microsoft.com/office/drawing/2014/main" id="{CB57DDCD-0D6D-F640-908D-82E74D58FDD5}"/>
+              </a:ext>
+            </a:extLst>
+          </p:cNvPr>
+          <p:cNvSpPr/>
+          <p:nvPr/>
+        </p:nvSpPr>
+        <p:spPr>
+          <a:xfrm>
+            <a:off x="4277216" y="1070013"/>
+            <a:ext cx="711930" cy="267637"/>
+          </a:xfrm>
+          <a:prstGeom prst="rect">
+            <a:avLst/>
+          </a:prstGeom>
+        </p:spPr>
+        <p:txBody>
+          <a:bodyPr wrap="square">
+            <a:spAutoFit/>
+          </a:bodyPr>
+          <a:lstStyle/>
+          <a:p>
+            <a:r>
+              <a:rPr lang="en-US" sz="1139" dirty="0"/>
+              <a:t>images</a:t>
+            </a:r>
+          </a:p>
+        </p:txBody>
+      </p:sp>
+      <p:sp>
+        <p:nvSpPr>
+          <p:cNvPr id="98" name="Rectangle 97">
+            <a:extLst>
+              <a:ext uri="{FF2B5EF4-FFF2-40B4-BE49-F238E27FC236}">
+                <a16:creationId xmlns:a16="http://schemas.microsoft.com/office/drawing/2014/main" id="{55FE24FC-E71F-6546-8273-D937EE29BF0F}"/>
+              </a:ext>
+            </a:extLst>
+          </p:cNvPr>
+          <p:cNvSpPr/>
+          <p:nvPr/>
+        </p:nvSpPr>
+        <p:spPr>
+          <a:xfrm>
+            <a:off x="1329062" y="1018429"/>
+            <a:ext cx="921353" cy="442942"/>
+          </a:xfrm>
+          <a:prstGeom prst="rect">
+            <a:avLst/>
+          </a:prstGeom>
+        </p:spPr>
+        <p:txBody>
+          <a:bodyPr wrap="square">
+            <a:spAutoFit/>
+          </a:bodyPr>
+          <a:lstStyle/>
+          <a:p>
+            <a:r>
+              <a:rPr lang="en-US" sz="1139" dirty="0"/>
+              <a:t>metadata</a:t>
+            </a:r>
+          </a:p>
+          <a:p>
+            <a:r>
+              <a:rPr lang="en-US" sz="1139" dirty="0"/>
+              <a:t>+ images</a:t>
+            </a:r>
+          </a:p>
+        </p:txBody>
+      </p:sp>
+      <p:pic>
+        <p:nvPicPr>
+          <p:cNvPr id="27" name="Picture 3" descr="Picture 3">
+            <a:extLst>
+              <a:ext uri="{FF2B5EF4-FFF2-40B4-BE49-F238E27FC236}">
+                <a16:creationId xmlns:a16="http://schemas.microsoft.com/office/drawing/2014/main" id="{11F0B70B-5ABC-3E4B-8321-FCA0C3FA72C4}"/>
+              </a:ext>
+            </a:extLst>
+          </p:cNvPr>
+          <p:cNvPicPr>
+            <a:picLocks noChangeAspect="1"/>
+          </p:cNvPicPr>
+          <p:nvPr/>
+        </p:nvPicPr>
+        <p:blipFill>
+          <a:blip r:embed="rId3" cstate="print">
+            <a:extLst>
+              <a:ext uri="{28A0092B-C50C-407E-A947-70E740481C1C}">
+                <a14:useLocalDpi xmlns:a14="http://schemas.microsoft.com/office/drawing/2010/main"/>
+              </a:ext>
+            </a:extLst>
+          </a:blip>
+          <a:stretch>
+            <a:fillRect/>
+          </a:stretch>
+        </p:blipFill>
+        <p:spPr>
+          <a:xfrm>
+            <a:off x="6249186" y="1733853"/>
+            <a:ext cx="1291208" cy="664973"/>
+          </a:xfrm>
+          <a:prstGeom prst="rect">
+            <a:avLst/>
+          </a:prstGeom>
+          <a:ln w="12700">
+            <a:miter lim="400000"/>
+          </a:ln>
+        </p:spPr>
+      </p:pic>
+      <p:cxnSp>
+        <p:nvCxnSpPr>
+          <p:cNvPr id="52" name="Straight Arrow Connector 51">
+            <a:extLst>
+              <a:ext uri="{FF2B5EF4-FFF2-40B4-BE49-F238E27FC236}">
+                <a16:creationId xmlns:a16="http://schemas.microsoft.com/office/drawing/2014/main" id="{85D06064-5B9A-714C-A343-BBB4A84B36B5}"/>
+              </a:ext>
+            </a:extLst>
+          </p:cNvPr>
+          <p:cNvCxnSpPr>
+            <a:cxnSpLocks/>
+          </p:cNvCxnSpPr>
+          <p:nvPr/>
+        </p:nvCxnSpPr>
+        <p:spPr>
+          <a:xfrm>
+            <a:off x="4024506" y="889162"/>
+            <a:ext cx="0" cy="627661"/>
+          </a:xfrm>
+          <a:prstGeom prst="straightConnector1">
+            <a:avLst/>
+          </a:prstGeom>
+          <a:noFill/>
+          <a:ln w="25400" cap="flat">
+            <a:solidFill>
+              <a:schemeClr val="accent1"/>
+            </a:solidFill>
+            <a:prstDash val="solid"/>
+            <a:round/>
+            <a:tailEnd type="triangle"/>
+          </a:ln>
+          <a:effectLst>
+            <a:outerShdw blurRad="38100" dist="20000" dir="5400000" rotWithShape="0">
+              <a:srgbClr val="000000">
+                <a:alpha val="38000"/>
+              </a:srgbClr>
+            </a:outerShdw>
+          </a:effectLst>
+          <a:sp3d/>
+        </p:spPr>
+        <p:style>
+          <a:lnRef idx="0">
+            <a:scrgbClr r="0" g="0" b="0"/>
+          </a:lnRef>
+          <a:fillRef idx="0">
+            <a:scrgbClr r="0" g="0" b="0"/>
+          </a:fillRef>
+          <a:effectRef idx="0">
+            <a:scrgbClr r="0" g="0" b="0"/>
+          </a:effectRef>
+          <a:fontRef idx="none"/>
+        </p:style>
+      </p:cxnSp>
+      <p:cxnSp>
+        <p:nvCxnSpPr>
+          <p:cNvPr id="53" name="Straight Arrow Connector 52">
+            <a:extLst>
+              <a:ext uri="{FF2B5EF4-FFF2-40B4-BE49-F238E27FC236}">
+                <a16:creationId xmlns:a16="http://schemas.microsoft.com/office/drawing/2014/main" id="{1EB3714C-07BE-6F42-8AE2-D1448C957680}"/>
+              </a:ext>
+            </a:extLst>
+          </p:cNvPr>
+          <p:cNvCxnSpPr>
+            <a:cxnSpLocks/>
+          </p:cNvCxnSpPr>
+          <p:nvPr/>
+        </p:nvCxnSpPr>
+        <p:spPr>
+          <a:xfrm flipV="1">
+            <a:off x="4230899" y="882099"/>
+            <a:ext cx="0" cy="631414"/>
+          </a:xfrm>
+          <a:prstGeom prst="straightConnector1">
+            <a:avLst/>
+          </a:prstGeom>
+          <a:noFill/>
+          <a:ln w="25400" cap="flat">
+            <a:solidFill>
+              <a:schemeClr val="accent1"/>
+            </a:solidFill>
+            <a:prstDash val="solid"/>
+            <a:round/>
+            <a:tailEnd type="triangle"/>
+          </a:ln>
+          <a:effectLst>
+            <a:outerShdw blurRad="38100" dist="20000" dir="5400000" rotWithShape="0">
+              <a:srgbClr val="000000">
+                <a:alpha val="38000"/>
+              </a:srgbClr>
+            </a:outerShdw>
+          </a:effectLst>
+          <a:sp3d/>
+        </p:spPr>
+        <p:style>
+          <a:lnRef idx="0">
+            <a:scrgbClr r="0" g="0" b="0"/>
+          </a:lnRef>
+          <a:fillRef idx="0">
+            <a:scrgbClr r="0" g="0" b="0"/>
+          </a:fillRef>
+          <a:effectRef idx="0">
+            <a:scrgbClr r="0" g="0" b="0"/>
+          </a:effectRef>
+          <a:fontRef idx="none"/>
+        </p:style>
+      </p:cxnSp>
+      <p:sp>
+        <p:nvSpPr>
+          <p:cNvPr id="36" name="Rectangle 35">
+            <a:extLst>
+              <a:ext uri="{FF2B5EF4-FFF2-40B4-BE49-F238E27FC236}">
+                <a16:creationId xmlns:a16="http://schemas.microsoft.com/office/drawing/2014/main" id="{EBE1E7B4-4DD9-0C44-97AC-BB717A89DF2D}"/>
+              </a:ext>
+            </a:extLst>
+          </p:cNvPr>
+          <p:cNvSpPr/>
+          <p:nvPr/>
+        </p:nvSpPr>
+        <p:spPr>
+          <a:xfrm>
+            <a:off x="111514" y="140484"/>
+            <a:ext cx="1862473" cy="715573"/>
+          </a:xfrm>
+          <a:prstGeom prst="rect">
+            <a:avLst/>
+          </a:prstGeom>
+          <a:solidFill>
+            <a:schemeClr val="accent1"/>
+          </a:solidFill>
+          <a:ln w="12700" cap="flat" cmpd="sng" algn="ctr">
+            <a:solidFill>
+              <a:srgbClr val="5B9BD5">
+                <a:shade val="50000"/>
+              </a:srgbClr>
+            </a:solidFill>
+            <a:prstDash val="solid"/>
+            <a:miter lim="800000"/>
+          </a:ln>
+          <a:effectLst/>
+        </p:spPr>
+        <p:txBody>
+          <a:bodyPr rtlCol="0" anchor="ctr"/>
+          <a:lstStyle/>
+          <a:p>
+            <a:pPr algn="ctr" defTabSz="1157114">
+              <a:defRPr/>
+            </a:pPr>
+            <a:r>
+              <a:rPr lang="en-US" sz="1519" kern="0" dirty="0">
+                <a:solidFill>
+                  <a:prstClr val="white"/>
+                </a:solidFill>
+                <a:latin typeface="Calibri" panose="020F0502020204030204"/>
+              </a:rPr>
+              <a:t>Client Application</a:t>
+            </a:r>
+          </a:p>
+        </p:txBody>
+      </p:sp>
+      <p:pic>
+        <p:nvPicPr>
+          <p:cNvPr id="3" name="Picture 2">
+            <a:extLst>
+              <a:ext uri="{FF2B5EF4-FFF2-40B4-BE49-F238E27FC236}">
+                <a16:creationId xmlns:a16="http://schemas.microsoft.com/office/drawing/2014/main" id="{8C938E72-FDB5-FA4C-A880-AB2A64609189}"/>
+              </a:ext>
+            </a:extLst>
+          </p:cNvPr>
+          <p:cNvPicPr>
+            <a:picLocks noChangeAspect="1"/>
+          </p:cNvPicPr>
+          <p:nvPr/>
+        </p:nvPicPr>
+        <p:blipFill>
+          <a:blip r:embed="rId4"/>
+          <a:stretch>
+            <a:fillRect/>
+          </a:stretch>
+        </p:blipFill>
+        <p:spPr>
+          <a:xfrm>
+            <a:off x="2149773" y="1564712"/>
+            <a:ext cx="1155606" cy="1011154"/>
+          </a:xfrm>
+          <a:prstGeom prst="rect">
+            <a:avLst/>
+          </a:prstGeom>
+        </p:spPr>
+      </p:pic>
+      <p:sp>
+        <p:nvSpPr>
+          <p:cNvPr id="44" name="Rectangle 43">
+            <a:extLst>
+              <a:ext uri="{FF2B5EF4-FFF2-40B4-BE49-F238E27FC236}">
+                <a16:creationId xmlns:a16="http://schemas.microsoft.com/office/drawing/2014/main" id="{35AAFD86-D64C-504F-8402-B83AB9F1988B}"/>
+              </a:ext>
+            </a:extLst>
+          </p:cNvPr>
+          <p:cNvSpPr/>
+          <p:nvPr/>
+        </p:nvSpPr>
+        <p:spPr>
+          <a:xfrm>
+            <a:off x="111501" y="3245004"/>
+            <a:ext cx="7510325" cy="356705"/>
+          </a:xfrm>
+          <a:prstGeom prst="rect">
+            <a:avLst/>
+          </a:prstGeom>
+          <a:solidFill>
+            <a:srgbClr val="70AD47">
+              <a:lumMod val="75000"/>
+            </a:srgbClr>
+          </a:solidFill>
+          <a:ln w="12700" cap="flat" cmpd="sng" algn="ctr">
+            <a:solidFill>
+              <a:srgbClr val="5B9BD5">
+                <a:shade val="50000"/>
+              </a:srgbClr>
+            </a:solidFill>
+            <a:prstDash val="solid"/>
+            <a:miter lim="800000"/>
+          </a:ln>
+          <a:effectLst/>
+        </p:spPr>
+        <p:txBody>
+          <a:bodyPr lIns="0" rIns="0" rtlCol="0" anchor="ctr"/>
+          <a:lstStyle/>
+          <a:p>
+            <a:pPr algn="ctr" defTabSz="1219170">
+              <a:defRPr/>
+            </a:pPr>
+            <a:r>
+              <a:rPr lang="en-US" sz="1600" kern="0" dirty="0">
+                <a:solidFill>
+                  <a:prstClr val="white"/>
+                </a:solidFill>
+                <a:latin typeface="Calibri" panose="020F0502020204030204"/>
+              </a:rPr>
+              <a:t>Image Repository - EXT4 Filesystem over RAID5</a:t>
+            </a:r>
+          </a:p>
+        </p:txBody>
+      </p:sp>
+      <p:sp>
+        <p:nvSpPr>
+          <p:cNvPr id="31" name="Rectangle 30">
+            <a:extLst>
+              <a:ext uri="{FF2B5EF4-FFF2-40B4-BE49-F238E27FC236}">
+                <a16:creationId xmlns:a16="http://schemas.microsoft.com/office/drawing/2014/main" id="{E80C7926-DCF0-0E42-B0B2-982BD741BC04}"/>
+              </a:ext>
+            </a:extLst>
+          </p:cNvPr>
+          <p:cNvSpPr/>
+          <p:nvPr/>
+        </p:nvSpPr>
+        <p:spPr>
+          <a:xfrm>
+            <a:off x="111514" y="1540229"/>
+            <a:ext cx="1862477" cy="1060121"/>
+          </a:xfrm>
+          <a:prstGeom prst="rect">
+            <a:avLst/>
+          </a:prstGeom>
+          <a:noFill/>
+          <a:ln w="12700" cap="flat" cmpd="sng" algn="ctr">
+            <a:solidFill>
+              <a:srgbClr val="5B9BD5">
+                <a:shade val="50000"/>
+              </a:srgbClr>
+            </a:solidFill>
+            <a:prstDash val="solid"/>
+            <a:miter lim="800000"/>
+          </a:ln>
+          <a:effectLst/>
+        </p:spPr>
+        <p:txBody>
+          <a:bodyPr rtlCol="0" anchor="ctr"/>
+          <a:lstStyle/>
+          <a:p>
+            <a:pPr algn="ctr" defTabSz="1157114">
+              <a:defRPr/>
+            </a:pPr>
+            <a:r>
+              <a:rPr lang="en-US" sz="2400" kern="0" dirty="0">
+                <a:solidFill>
+                  <a:srgbClr val="0070C0"/>
+                </a:solidFill>
+                <a:latin typeface="Calibri" panose="020F0502020204030204"/>
+              </a:rPr>
+              <a:t>VDMS</a:t>
+            </a:r>
+            <a:endParaRPr lang="en-US" sz="1519" kern="0" dirty="0">
+              <a:solidFill>
+                <a:srgbClr val="0070C0"/>
+              </a:solidFill>
+              <a:latin typeface="Calibri" panose="020F0502020204030204"/>
+            </a:endParaRPr>
+          </a:p>
+        </p:txBody>
+      </p:sp>
+      <p:sp>
+        <p:nvSpPr>
+          <p:cNvPr id="46" name="Rectangle 45">
+            <a:extLst>
+              <a:ext uri="{FF2B5EF4-FFF2-40B4-BE49-F238E27FC236}">
+                <a16:creationId xmlns:a16="http://schemas.microsoft.com/office/drawing/2014/main" id="{08099ED3-5BFC-344D-B268-651040652DEF}"/>
+              </a:ext>
+            </a:extLst>
+          </p:cNvPr>
+          <p:cNvSpPr/>
+          <p:nvPr/>
+        </p:nvSpPr>
+        <p:spPr>
+          <a:xfrm>
+            <a:off x="3591511" y="1540229"/>
+            <a:ext cx="2507993" cy="1058385"/>
+          </a:xfrm>
+          <a:prstGeom prst="rect">
+            <a:avLst/>
+          </a:prstGeom>
+          <a:noFill/>
+          <a:ln w="12700" cap="flat" cmpd="sng" algn="ctr">
+            <a:solidFill>
+              <a:srgbClr val="5B9BD5">
+                <a:shade val="50000"/>
+              </a:srgbClr>
+            </a:solidFill>
+            <a:prstDash val="solid"/>
+            <a:miter lim="800000"/>
+          </a:ln>
+          <a:effectLst/>
+        </p:spPr>
+        <p:txBody>
+          <a:bodyPr rtlCol="0" anchor="ctr"/>
+          <a:lstStyle/>
+          <a:p>
+            <a:pPr algn="ctr" defTabSz="1157114">
+              <a:defRPr/>
+            </a:pPr>
+            <a:endParaRPr lang="en-US" sz="1519" kern="0" dirty="0">
+              <a:solidFill>
+                <a:prstClr val="white"/>
+              </a:solidFill>
+              <a:latin typeface="Calibri" panose="020F0502020204030204"/>
+            </a:endParaRPr>
+          </a:p>
+        </p:txBody>
+      </p:sp>
+      <p:sp>
+        <p:nvSpPr>
+          <p:cNvPr id="47" name="Rectangle 46">
+            <a:extLst>
+              <a:ext uri="{FF2B5EF4-FFF2-40B4-BE49-F238E27FC236}">
+                <a16:creationId xmlns:a16="http://schemas.microsoft.com/office/drawing/2014/main" id="{9788CA3F-D506-F34D-8D92-70E1D209F280}"/>
+              </a:ext>
+            </a:extLst>
+          </p:cNvPr>
+          <p:cNvSpPr/>
+          <p:nvPr/>
+        </p:nvSpPr>
+        <p:spPr>
+          <a:xfrm>
+            <a:off x="2042220" y="146878"/>
+            <a:ext cx="2830833" cy="715573"/>
+          </a:xfrm>
+          <a:prstGeom prst="rect">
+            <a:avLst/>
+          </a:prstGeom>
+          <a:solidFill>
+            <a:schemeClr val="accent1"/>
+          </a:solidFill>
+          <a:ln w="12700" cap="flat" cmpd="sng" algn="ctr">
+            <a:solidFill>
+              <a:srgbClr val="5B9BD5">
+                <a:shade val="50000"/>
+              </a:srgbClr>
+            </a:solidFill>
+            <a:prstDash val="solid"/>
+            <a:miter lim="800000"/>
+          </a:ln>
+          <a:effectLst/>
+        </p:spPr>
+        <p:txBody>
+          <a:bodyPr rtlCol="0" anchor="ctr"/>
+          <a:lstStyle/>
+          <a:p>
+            <a:pPr algn="ctr" defTabSz="1157114">
+              <a:defRPr/>
+            </a:pPr>
+            <a:r>
+              <a:rPr lang="en-US" sz="1519" kern="0" dirty="0">
+                <a:solidFill>
+                  <a:prstClr val="white"/>
+                </a:solidFill>
+                <a:latin typeface="Calibri" panose="020F0502020204030204"/>
+              </a:rPr>
+              <a:t>Client Application</a:t>
+            </a:r>
+          </a:p>
+        </p:txBody>
+      </p:sp>
+      <p:sp>
+        <p:nvSpPr>
+          <p:cNvPr id="48" name="Rectangle 47">
+            <a:extLst>
+              <a:ext uri="{FF2B5EF4-FFF2-40B4-BE49-F238E27FC236}">
+                <a16:creationId xmlns:a16="http://schemas.microsoft.com/office/drawing/2014/main" id="{AB7E2963-F3AC-C547-B6E2-880D1AD596F1}"/>
+              </a:ext>
+            </a:extLst>
+          </p:cNvPr>
+          <p:cNvSpPr/>
+          <p:nvPr/>
+        </p:nvSpPr>
+        <p:spPr>
+          <a:xfrm>
+            <a:off x="3983839" y="633112"/>
+            <a:ext cx="865538" cy="229058"/>
+          </a:xfrm>
+          <a:prstGeom prst="rect">
+            <a:avLst/>
+          </a:prstGeom>
+          <a:solidFill>
+            <a:srgbClr val="70AD47">
+              <a:lumMod val="75000"/>
+            </a:srgbClr>
+          </a:solidFill>
+          <a:ln w="12700" cap="flat" cmpd="sng" algn="ctr">
+            <a:solidFill>
+              <a:srgbClr val="5B9BD5">
+                <a:shade val="50000"/>
+              </a:srgbClr>
+            </a:solidFill>
+            <a:prstDash val="solid"/>
+            <a:miter lim="800000"/>
+          </a:ln>
+          <a:effectLst/>
+        </p:spPr>
+        <p:txBody>
+          <a:bodyPr rtlCol="0" anchor="ctr"/>
+          <a:lstStyle/>
+          <a:p>
+            <a:pPr algn="ctr" defTabSz="914400">
+              <a:defRPr/>
+            </a:pPr>
+            <a:r>
+              <a:rPr lang="en-US" sz="1100" kern="0" dirty="0">
+                <a:solidFill>
+                  <a:prstClr val="white"/>
+                </a:solidFill>
+                <a:latin typeface="Calibri" panose="020F0502020204030204"/>
+              </a:rPr>
+              <a:t>OpenCV</a:t>
+            </a:r>
+          </a:p>
+        </p:txBody>
+      </p:sp>
+      <p:sp>
+        <p:nvSpPr>
+          <p:cNvPr id="49" name="Rectangle 48">
+            <a:extLst>
+              <a:ext uri="{FF2B5EF4-FFF2-40B4-BE49-F238E27FC236}">
+                <a16:creationId xmlns:a16="http://schemas.microsoft.com/office/drawing/2014/main" id="{13A3B570-9776-2145-A807-A57B7391C633}"/>
+              </a:ext>
+            </a:extLst>
+          </p:cNvPr>
+          <p:cNvSpPr/>
+          <p:nvPr/>
+        </p:nvSpPr>
+        <p:spPr>
+          <a:xfrm>
+            <a:off x="4917693" y="154860"/>
+            <a:ext cx="2704149" cy="715573"/>
+          </a:xfrm>
+          <a:prstGeom prst="rect">
+            <a:avLst/>
+          </a:prstGeom>
+          <a:solidFill>
+            <a:schemeClr val="accent1"/>
+          </a:solidFill>
+          <a:ln w="12700" cap="flat" cmpd="sng" algn="ctr">
+            <a:solidFill>
+              <a:srgbClr val="5B9BD5">
+                <a:shade val="50000"/>
+              </a:srgbClr>
+            </a:solidFill>
+            <a:prstDash val="solid"/>
+            <a:miter lim="800000"/>
+          </a:ln>
+          <a:effectLst/>
+        </p:spPr>
+        <p:txBody>
+          <a:bodyPr rtlCol="0" anchor="ctr"/>
+          <a:lstStyle/>
+          <a:p>
+            <a:pPr algn="ctr" defTabSz="1157114">
+              <a:defRPr/>
+            </a:pPr>
+            <a:r>
+              <a:rPr lang="en-US" sz="1519" kern="0" dirty="0">
+                <a:solidFill>
+                  <a:prstClr val="white"/>
+                </a:solidFill>
+                <a:latin typeface="Calibri" panose="020F0502020204030204"/>
+              </a:rPr>
+              <a:t>Client Application</a:t>
+            </a:r>
+          </a:p>
+        </p:txBody>
+      </p:sp>
+      <p:sp>
+        <p:nvSpPr>
+          <p:cNvPr id="50" name="Rectangle 49">
+            <a:extLst>
+              <a:ext uri="{FF2B5EF4-FFF2-40B4-BE49-F238E27FC236}">
+                <a16:creationId xmlns:a16="http://schemas.microsoft.com/office/drawing/2014/main" id="{33B08407-03A3-8241-A3EC-24EFFDE75D2E}"/>
+              </a:ext>
+            </a:extLst>
+          </p:cNvPr>
+          <p:cNvSpPr/>
+          <p:nvPr/>
+        </p:nvSpPr>
+        <p:spPr>
+          <a:xfrm>
+            <a:off x="4928876" y="635229"/>
+            <a:ext cx="865538" cy="229058"/>
+          </a:xfrm>
+          <a:prstGeom prst="rect">
+            <a:avLst/>
+          </a:prstGeom>
+          <a:solidFill>
+            <a:srgbClr val="70AD47">
+              <a:lumMod val="75000"/>
+            </a:srgbClr>
+          </a:solidFill>
+          <a:ln w="12700" cap="flat" cmpd="sng" algn="ctr">
+            <a:solidFill>
+              <a:srgbClr val="5B9BD5">
+                <a:shade val="50000"/>
+              </a:srgbClr>
+            </a:solidFill>
+            <a:prstDash val="solid"/>
+            <a:miter lim="800000"/>
+          </a:ln>
+          <a:effectLst/>
+        </p:spPr>
+        <p:txBody>
+          <a:bodyPr rtlCol="0" anchor="ctr"/>
+          <a:lstStyle/>
+          <a:p>
+            <a:pPr algn="ctr" defTabSz="914400">
+              <a:defRPr/>
+            </a:pPr>
+            <a:r>
+              <a:rPr lang="en-US" sz="1100" kern="0" dirty="0">
+                <a:solidFill>
+                  <a:prstClr val="white"/>
+                </a:solidFill>
+                <a:latin typeface="Calibri" panose="020F0502020204030204"/>
+              </a:rPr>
+              <a:t>OpenCV</a:t>
+            </a:r>
+          </a:p>
+        </p:txBody>
+      </p:sp>
+      <p:sp>
+        <p:nvSpPr>
+          <p:cNvPr id="51" name="Rectangle 50">
+            <a:extLst>
+              <a:ext uri="{FF2B5EF4-FFF2-40B4-BE49-F238E27FC236}">
+                <a16:creationId xmlns:a16="http://schemas.microsoft.com/office/drawing/2014/main" id="{A5B86E96-952F-9C44-9E42-1E602FE4E78B}"/>
+              </a:ext>
+            </a:extLst>
+          </p:cNvPr>
+          <p:cNvSpPr/>
+          <p:nvPr/>
+        </p:nvSpPr>
+        <p:spPr>
+          <a:xfrm>
+            <a:off x="6167727" y="1537148"/>
+            <a:ext cx="1454127" cy="1058385"/>
+          </a:xfrm>
+          <a:prstGeom prst="rect">
+            <a:avLst/>
+          </a:prstGeom>
+          <a:noFill/>
+          <a:ln w="12700" cap="flat" cmpd="sng" algn="ctr">
+            <a:solidFill>
+              <a:srgbClr val="5B9BD5">
+                <a:shade val="50000"/>
+              </a:srgbClr>
+            </a:solidFill>
+            <a:prstDash val="solid"/>
+            <a:miter lim="800000"/>
+          </a:ln>
+          <a:effectLst/>
+        </p:spPr>
+        <p:txBody>
+          <a:bodyPr rtlCol="0" anchor="ctr"/>
+          <a:lstStyle/>
+          <a:p>
+            <a:pPr algn="ctr" defTabSz="1157114">
+              <a:defRPr/>
+            </a:pPr>
+            <a:endParaRPr lang="en-US" sz="1519" kern="0" dirty="0">
+              <a:solidFill>
+                <a:prstClr val="white"/>
+              </a:solidFill>
+              <a:latin typeface="Calibri" panose="020F0502020204030204"/>
+            </a:endParaRPr>
+          </a:p>
+        </p:txBody>
+      </p:sp>
+      <p:cxnSp>
+        <p:nvCxnSpPr>
+          <p:cNvPr id="54" name="Straight Arrow Connector 53">
+            <a:extLst>
+              <a:ext uri="{FF2B5EF4-FFF2-40B4-BE49-F238E27FC236}">
+                <a16:creationId xmlns:a16="http://schemas.microsoft.com/office/drawing/2014/main" id="{7D7D5A71-D6A2-654E-922E-B0C91FE02A9F}"/>
+              </a:ext>
+            </a:extLst>
+          </p:cNvPr>
+          <p:cNvCxnSpPr>
+            <a:cxnSpLocks/>
+          </p:cNvCxnSpPr>
+          <p:nvPr/>
+        </p:nvCxnSpPr>
+        <p:spPr>
+          <a:xfrm>
+            <a:off x="5549893" y="881484"/>
+            <a:ext cx="0" cy="627661"/>
+          </a:xfrm>
+          <a:prstGeom prst="straightConnector1">
+            <a:avLst/>
+          </a:prstGeom>
+          <a:noFill/>
+          <a:ln w="25400" cap="flat">
+            <a:solidFill>
+              <a:schemeClr val="accent1"/>
+            </a:solidFill>
+            <a:prstDash val="solid"/>
+            <a:round/>
+            <a:tailEnd type="triangle"/>
+          </a:ln>
+          <a:effectLst>
+            <a:outerShdw blurRad="38100" dist="20000" dir="5400000" rotWithShape="0">
+              <a:srgbClr val="000000">
+                <a:alpha val="38000"/>
+              </a:srgbClr>
+            </a:outerShdw>
+          </a:effectLst>
+          <a:sp3d/>
+        </p:spPr>
+        <p:style>
+          <a:lnRef idx="0">
+            <a:scrgbClr r="0" g="0" b="0"/>
+          </a:lnRef>
+          <a:fillRef idx="0">
+            <a:scrgbClr r="0" g="0" b="0"/>
+          </a:fillRef>
+          <a:effectRef idx="0">
+            <a:scrgbClr r="0" g="0" b="0"/>
+          </a:effectRef>
+          <a:fontRef idx="none"/>
+        </p:style>
+      </p:cxnSp>
+      <p:cxnSp>
+        <p:nvCxnSpPr>
+          <p:cNvPr id="55" name="Straight Arrow Connector 54">
+            <a:extLst>
+              <a:ext uri="{FF2B5EF4-FFF2-40B4-BE49-F238E27FC236}">
+                <a16:creationId xmlns:a16="http://schemas.microsoft.com/office/drawing/2014/main" id="{15D85392-95DC-C140-B256-72908D6C1622}"/>
+              </a:ext>
+            </a:extLst>
+          </p:cNvPr>
+          <p:cNvCxnSpPr>
+            <a:cxnSpLocks/>
+          </p:cNvCxnSpPr>
+          <p:nvPr/>
+        </p:nvCxnSpPr>
+        <p:spPr>
+          <a:xfrm flipV="1">
+            <a:off x="5756286" y="874421"/>
+            <a:ext cx="0" cy="631414"/>
+          </a:xfrm>
+          <a:prstGeom prst="straightConnector1">
+            <a:avLst/>
+          </a:prstGeom>
+          <a:noFill/>
+          <a:ln w="25400" cap="flat">
+            <a:solidFill>
+              <a:schemeClr val="accent1"/>
+            </a:solidFill>
+            <a:prstDash val="solid"/>
+            <a:round/>
+            <a:tailEnd type="triangle"/>
+          </a:ln>
+          <a:effectLst>
+            <a:outerShdw blurRad="38100" dist="20000" dir="5400000" rotWithShape="0">
+              <a:srgbClr val="000000">
+                <a:alpha val="38000"/>
+              </a:srgbClr>
+            </a:outerShdw>
+          </a:effectLst>
+          <a:sp3d/>
+        </p:spPr>
+        <p:style>
+          <a:lnRef idx="0">
+            <a:scrgbClr r="0" g="0" b="0"/>
+          </a:lnRef>
+          <a:fillRef idx="0">
+            <a:scrgbClr r="0" g="0" b="0"/>
+          </a:fillRef>
+          <a:effectRef idx="0">
+            <a:scrgbClr r="0" g="0" b="0"/>
+          </a:effectRef>
+          <a:fontRef idx="none"/>
+        </p:style>
+      </p:cxnSp>
+      <p:sp>
+        <p:nvSpPr>
+          <p:cNvPr id="56" name="Rectangle 55">
+            <a:extLst>
+              <a:ext uri="{FF2B5EF4-FFF2-40B4-BE49-F238E27FC236}">
+                <a16:creationId xmlns:a16="http://schemas.microsoft.com/office/drawing/2014/main" id="{D8A6A747-6FC6-1048-92D8-73D456863CCB}"/>
+              </a:ext>
+            </a:extLst>
+          </p:cNvPr>
+          <p:cNvSpPr/>
+          <p:nvPr/>
+        </p:nvSpPr>
+        <p:spPr>
+          <a:xfrm>
+            <a:off x="5736626" y="1049988"/>
+            <a:ext cx="769786" cy="267637"/>
+          </a:xfrm>
+          <a:prstGeom prst="rect">
+            <a:avLst/>
+          </a:prstGeom>
+        </p:spPr>
+        <p:txBody>
+          <a:bodyPr wrap="square">
+            <a:spAutoFit/>
+          </a:bodyPr>
+          <a:lstStyle/>
+          <a:p>
+            <a:r>
+              <a:rPr lang="en-US" sz="1139" dirty="0"/>
+              <a:t>images</a:t>
+            </a:r>
+          </a:p>
+        </p:txBody>
+      </p:sp>
+      <p:sp>
+        <p:nvSpPr>
+          <p:cNvPr id="57" name="Rectangle 56">
+            <a:extLst>
+              <a:ext uri="{FF2B5EF4-FFF2-40B4-BE49-F238E27FC236}">
+                <a16:creationId xmlns:a16="http://schemas.microsoft.com/office/drawing/2014/main" id="{5BE3A231-7FC3-F748-A3E0-C0F3B44B967C}"/>
+              </a:ext>
+            </a:extLst>
+          </p:cNvPr>
+          <p:cNvSpPr/>
+          <p:nvPr/>
+        </p:nvSpPr>
+        <p:spPr>
+          <a:xfrm>
+            <a:off x="6923377" y="1065510"/>
+            <a:ext cx="793263" cy="267637"/>
+          </a:xfrm>
+          <a:prstGeom prst="rect">
+            <a:avLst/>
+          </a:prstGeom>
+        </p:spPr>
+        <p:txBody>
+          <a:bodyPr wrap="square">
+            <a:spAutoFit/>
+          </a:bodyPr>
+          <a:lstStyle/>
+          <a:p>
+            <a:r>
+              <a:rPr lang="en-US" sz="1139" dirty="0"/>
+              <a:t>metadata</a:t>
+            </a:r>
+          </a:p>
+        </p:txBody>
+      </p:sp>
+      <p:cxnSp>
+        <p:nvCxnSpPr>
+          <p:cNvPr id="58" name="Straight Arrow Connector 57">
+            <a:extLst>
+              <a:ext uri="{FF2B5EF4-FFF2-40B4-BE49-F238E27FC236}">
+                <a16:creationId xmlns:a16="http://schemas.microsoft.com/office/drawing/2014/main" id="{C18D677E-83E8-F24F-AD27-512791F2009E}"/>
+              </a:ext>
+            </a:extLst>
+          </p:cNvPr>
+          <p:cNvCxnSpPr>
+            <a:cxnSpLocks/>
+          </p:cNvCxnSpPr>
+          <p:nvPr/>
+        </p:nvCxnSpPr>
+        <p:spPr>
+          <a:xfrm>
+            <a:off x="6670668" y="884659"/>
+            <a:ext cx="0" cy="627661"/>
+          </a:xfrm>
+          <a:prstGeom prst="straightConnector1">
+            <a:avLst/>
+          </a:prstGeom>
+          <a:noFill/>
+          <a:ln w="25400" cap="flat">
+            <a:solidFill>
+              <a:schemeClr val="accent1"/>
+            </a:solidFill>
+            <a:prstDash val="solid"/>
+            <a:round/>
+            <a:tailEnd type="triangle"/>
+          </a:ln>
+          <a:effectLst>
+            <a:outerShdw blurRad="38100" dist="20000" dir="5400000" rotWithShape="0">
+              <a:srgbClr val="000000">
+                <a:alpha val="38000"/>
+              </a:srgbClr>
+            </a:outerShdw>
+          </a:effectLst>
+          <a:sp3d/>
+        </p:spPr>
+        <p:style>
+          <a:lnRef idx="0">
+            <a:scrgbClr r="0" g="0" b="0"/>
+          </a:lnRef>
+          <a:fillRef idx="0">
+            <a:scrgbClr r="0" g="0" b="0"/>
+          </a:fillRef>
+          <a:effectRef idx="0">
+            <a:scrgbClr r="0" g="0" b="0"/>
+          </a:effectRef>
+          <a:fontRef idx="none"/>
+        </p:style>
+      </p:cxnSp>
+      <p:cxnSp>
+        <p:nvCxnSpPr>
+          <p:cNvPr id="59" name="Straight Arrow Connector 58">
+            <a:extLst>
+              <a:ext uri="{FF2B5EF4-FFF2-40B4-BE49-F238E27FC236}">
+                <a16:creationId xmlns:a16="http://schemas.microsoft.com/office/drawing/2014/main" id="{52AE89FF-4A49-004A-9BB6-68524A58E200}"/>
+              </a:ext>
+            </a:extLst>
+          </p:cNvPr>
+          <p:cNvCxnSpPr>
+            <a:cxnSpLocks/>
+          </p:cNvCxnSpPr>
+          <p:nvPr/>
+        </p:nvCxnSpPr>
+        <p:spPr>
+          <a:xfrm flipV="1">
+            <a:off x="6877061" y="877596"/>
+            <a:ext cx="0" cy="631414"/>
+          </a:xfrm>
+          <a:prstGeom prst="straightConnector1">
+            <a:avLst/>
+          </a:prstGeom>
+          <a:noFill/>
+          <a:ln w="25400" cap="flat">
+            <a:solidFill>
+              <a:schemeClr val="accent1"/>
+            </a:solidFill>
+            <a:prstDash val="solid"/>
+            <a:round/>
+            <a:tailEnd type="triangle"/>
+          </a:ln>
+          <a:effectLst>
+            <a:outerShdw blurRad="38100" dist="20000" dir="5400000" rotWithShape="0">
+              <a:srgbClr val="000000">
+                <a:alpha val="38000"/>
+              </a:srgbClr>
+            </a:outerShdw>
+          </a:effectLst>
+          <a:sp3d/>
+        </p:spPr>
+        <p:style>
+          <a:lnRef idx="0">
+            <a:scrgbClr r="0" g="0" b="0"/>
+          </a:lnRef>
+          <a:fillRef idx="0">
+            <a:scrgbClr r="0" g="0" b="0"/>
+          </a:fillRef>
+          <a:effectRef idx="0">
+            <a:scrgbClr r="0" g="0" b="0"/>
+          </a:effectRef>
+          <a:fontRef idx="none"/>
+        </p:style>
+      </p:cxnSp>
+      <p:sp>
+        <p:nvSpPr>
+          <p:cNvPr id="60" name="Rectangle 59">
+            <a:extLst>
+              <a:ext uri="{FF2B5EF4-FFF2-40B4-BE49-F238E27FC236}">
+                <a16:creationId xmlns:a16="http://schemas.microsoft.com/office/drawing/2014/main" id="{7CA3837E-8164-FA48-B644-9A9C66099722}"/>
+              </a:ext>
+            </a:extLst>
+          </p:cNvPr>
+          <p:cNvSpPr/>
+          <p:nvPr/>
+        </p:nvSpPr>
+        <p:spPr>
+          <a:xfrm>
+            <a:off x="111500" y="2680719"/>
+            <a:ext cx="1212555" cy="356705"/>
+          </a:xfrm>
+          <a:prstGeom prst="rect">
+            <a:avLst/>
+          </a:prstGeom>
+          <a:solidFill>
+            <a:srgbClr val="70AD47">
+              <a:lumMod val="75000"/>
+            </a:srgbClr>
+          </a:solidFill>
+          <a:ln w="12700" cap="flat" cmpd="sng" algn="ctr">
+            <a:solidFill>
+              <a:srgbClr val="5B9BD5">
+                <a:shade val="50000"/>
+              </a:srgbClr>
+            </a:solidFill>
+            <a:prstDash val="solid"/>
+            <a:miter lim="800000"/>
+          </a:ln>
+          <a:effectLst/>
+        </p:spPr>
+        <p:txBody>
+          <a:bodyPr lIns="0" rIns="0" rtlCol="0" anchor="ctr"/>
+          <a:lstStyle/>
+          <a:p>
+            <a:pPr algn="ctr" defTabSz="1219170">
+              <a:defRPr/>
+            </a:pPr>
+            <a:r>
+              <a:rPr lang="en-US" sz="1200" kern="0" dirty="0">
+                <a:solidFill>
+                  <a:prstClr val="white"/>
+                </a:solidFill>
+                <a:latin typeface="Calibri" panose="020F0502020204030204"/>
+              </a:rPr>
+              <a:t>EXT4 Filesystem</a:t>
+            </a:r>
+          </a:p>
+        </p:txBody>
+      </p:sp>
+      <p:sp>
+        <p:nvSpPr>
+          <p:cNvPr id="61" name="Rectangle 60">
+            <a:extLst>
+              <a:ext uri="{FF2B5EF4-FFF2-40B4-BE49-F238E27FC236}">
+                <a16:creationId xmlns:a16="http://schemas.microsoft.com/office/drawing/2014/main" id="{AFD82516-BFE7-9F46-81ED-9A200871F5C7}"/>
+              </a:ext>
+            </a:extLst>
+          </p:cNvPr>
+          <p:cNvSpPr/>
+          <p:nvPr/>
+        </p:nvSpPr>
+        <p:spPr>
+          <a:xfrm>
+            <a:off x="2042219" y="2688138"/>
+            <a:ext cx="1454127" cy="356705"/>
+          </a:xfrm>
+          <a:prstGeom prst="rect">
+            <a:avLst/>
+          </a:prstGeom>
+          <a:solidFill>
+            <a:srgbClr val="70AD47">
+              <a:lumMod val="75000"/>
+            </a:srgbClr>
+          </a:solidFill>
+          <a:ln w="12700" cap="flat" cmpd="sng" algn="ctr">
+            <a:solidFill>
+              <a:srgbClr val="5B9BD5">
+                <a:shade val="50000"/>
+              </a:srgbClr>
+            </a:solidFill>
+            <a:prstDash val="solid"/>
+            <a:miter lim="800000"/>
+          </a:ln>
+          <a:effectLst/>
+        </p:spPr>
+        <p:txBody>
+          <a:bodyPr lIns="0" rIns="0" rtlCol="0" anchor="ctr"/>
+          <a:lstStyle/>
+          <a:p>
+            <a:pPr algn="ctr" defTabSz="1219170">
+              <a:defRPr/>
+            </a:pPr>
+            <a:r>
+              <a:rPr lang="en-US" sz="1200" kern="0" dirty="0">
+                <a:solidFill>
+                  <a:prstClr val="white"/>
+                </a:solidFill>
+                <a:latin typeface="Calibri" panose="020F0502020204030204"/>
+              </a:rPr>
+              <a:t>EXT4 Filesystem</a:t>
+            </a:r>
+          </a:p>
+        </p:txBody>
+      </p:sp>
+      <p:sp>
+        <p:nvSpPr>
+          <p:cNvPr id="68" name="Rectangle 67">
+            <a:extLst>
+              <a:ext uri="{FF2B5EF4-FFF2-40B4-BE49-F238E27FC236}">
+                <a16:creationId xmlns:a16="http://schemas.microsoft.com/office/drawing/2014/main" id="{4D201D11-E6B4-9841-85EC-18C86116D5E1}"/>
+              </a:ext>
+            </a:extLst>
+          </p:cNvPr>
+          <p:cNvSpPr/>
+          <p:nvPr/>
+        </p:nvSpPr>
+        <p:spPr>
+          <a:xfrm>
+            <a:off x="6162123" y="2688138"/>
+            <a:ext cx="1459703" cy="356705"/>
+          </a:xfrm>
+          <a:prstGeom prst="rect">
+            <a:avLst/>
+          </a:prstGeom>
+          <a:solidFill>
+            <a:srgbClr val="70AD47">
+              <a:lumMod val="75000"/>
+            </a:srgbClr>
+          </a:solidFill>
+          <a:ln w="12700" cap="flat" cmpd="sng" algn="ctr">
+            <a:solidFill>
+              <a:srgbClr val="5B9BD5">
+                <a:shade val="50000"/>
+              </a:srgbClr>
+            </a:solidFill>
+            <a:prstDash val="solid"/>
+            <a:miter lim="800000"/>
+          </a:ln>
+          <a:effectLst/>
+        </p:spPr>
+        <p:txBody>
+          <a:bodyPr lIns="0" rIns="0" rtlCol="0" anchor="ctr"/>
+          <a:lstStyle/>
+          <a:p>
+            <a:pPr algn="ctr" defTabSz="1219170">
+              <a:defRPr/>
+            </a:pPr>
+            <a:r>
+              <a:rPr lang="en-US" sz="1200" kern="0" dirty="0">
+                <a:solidFill>
+                  <a:prstClr val="white"/>
+                </a:solidFill>
+                <a:latin typeface="Calibri" panose="020F0502020204030204"/>
+              </a:rPr>
+              <a:t>EXT4 Filesystem</a:t>
+            </a:r>
+          </a:p>
+        </p:txBody>
+      </p:sp>
+      <p:cxnSp>
+        <p:nvCxnSpPr>
+          <p:cNvPr id="80" name="Straight Arrow Connector 79">
+            <a:extLst>
+              <a:ext uri="{FF2B5EF4-FFF2-40B4-BE49-F238E27FC236}">
+                <a16:creationId xmlns:a16="http://schemas.microsoft.com/office/drawing/2014/main" id="{095D7FF7-9153-DB4A-871C-7F4D04AF3D2F}"/>
+              </a:ext>
+            </a:extLst>
+          </p:cNvPr>
+          <p:cNvCxnSpPr>
+            <a:cxnSpLocks/>
+          </p:cNvCxnSpPr>
+          <p:nvPr/>
+        </p:nvCxnSpPr>
+        <p:spPr>
+          <a:xfrm>
+            <a:off x="1470856" y="2595533"/>
+            <a:ext cx="0" cy="639752"/>
+          </a:xfrm>
+          <a:prstGeom prst="straightConnector1">
+            <a:avLst/>
+          </a:prstGeom>
+          <a:noFill/>
+          <a:ln w="25400" cap="flat">
+            <a:solidFill>
+              <a:schemeClr val="accent1"/>
+            </a:solidFill>
+            <a:prstDash val="solid"/>
+            <a:round/>
+            <a:tailEnd type="triangle"/>
+          </a:ln>
+          <a:effectLst>
+            <a:outerShdw blurRad="38100" dist="20000" dir="5400000" rotWithShape="0">
+              <a:srgbClr val="000000">
+                <a:alpha val="38000"/>
+              </a:srgbClr>
+            </a:outerShdw>
+          </a:effectLst>
+          <a:sp3d/>
+        </p:spPr>
+        <p:style>
+          <a:lnRef idx="0">
+            <a:scrgbClr r="0" g="0" b="0"/>
+          </a:lnRef>
+          <a:fillRef idx="0">
+            <a:scrgbClr r="0" g="0" b="0"/>
+          </a:fillRef>
+          <a:effectRef idx="0">
+            <a:scrgbClr r="0" g="0" b="0"/>
+          </a:effectRef>
+          <a:fontRef idx="none"/>
+        </p:style>
+      </p:cxnSp>
+      <p:cxnSp>
+        <p:nvCxnSpPr>
+          <p:cNvPr id="81" name="Straight Arrow Connector 80">
+            <a:extLst>
+              <a:ext uri="{FF2B5EF4-FFF2-40B4-BE49-F238E27FC236}">
+                <a16:creationId xmlns:a16="http://schemas.microsoft.com/office/drawing/2014/main" id="{61539D60-CDA0-7E4E-9115-6A144790E948}"/>
+              </a:ext>
+            </a:extLst>
+          </p:cNvPr>
+          <p:cNvCxnSpPr>
+            <a:cxnSpLocks/>
+          </p:cNvCxnSpPr>
+          <p:nvPr/>
+        </p:nvCxnSpPr>
+        <p:spPr>
+          <a:xfrm flipV="1">
+            <a:off x="1608133" y="2595533"/>
+            <a:ext cx="0" cy="639752"/>
+          </a:xfrm>
+          <a:prstGeom prst="straightConnector1">
+            <a:avLst/>
+          </a:prstGeom>
+          <a:noFill/>
+          <a:ln w="25400" cap="flat">
+            <a:solidFill>
+              <a:schemeClr val="accent1"/>
+            </a:solidFill>
+            <a:prstDash val="solid"/>
+            <a:round/>
+            <a:tailEnd type="triangle"/>
+          </a:ln>
+          <a:effectLst>
+            <a:outerShdw blurRad="38100" dist="20000" dir="5400000" rotWithShape="0">
+              <a:srgbClr val="000000">
+                <a:alpha val="38000"/>
+              </a:srgbClr>
+            </a:outerShdw>
+          </a:effectLst>
+          <a:sp3d/>
+        </p:spPr>
+        <p:style>
+          <a:lnRef idx="0">
+            <a:scrgbClr r="0" g="0" b="0"/>
+          </a:lnRef>
+          <a:fillRef idx="0">
+            <a:scrgbClr r="0" g="0" b="0"/>
+          </a:fillRef>
+          <a:effectRef idx="0">
+            <a:scrgbClr r="0" g="0" b="0"/>
+          </a:effectRef>
+          <a:fontRef idx="none"/>
+        </p:style>
+      </p:cxnSp>
+      <p:cxnSp>
+        <p:nvCxnSpPr>
+          <p:cNvPr id="15" name="Straight Connector 14">
+            <a:extLst>
+              <a:ext uri="{FF2B5EF4-FFF2-40B4-BE49-F238E27FC236}">
+                <a16:creationId xmlns:a16="http://schemas.microsoft.com/office/drawing/2014/main" id="{1D5EE557-8DBD-8249-AB91-29CFA9BEBD43}"/>
+              </a:ext>
+            </a:extLst>
+          </p:cNvPr>
+          <p:cNvCxnSpPr/>
+          <p:nvPr/>
+        </p:nvCxnSpPr>
+        <p:spPr>
+          <a:xfrm>
+            <a:off x="50180" y="3124353"/>
+            <a:ext cx="7666460" cy="0"/>
+          </a:xfrm>
+          <a:prstGeom prst="line">
+            <a:avLst/>
+          </a:prstGeom>
+          <a:ln>
+            <a:prstDash val="dash"/>
+          </a:ln>
+        </p:spPr>
+        <p:style>
+          <a:lnRef idx="1">
+            <a:schemeClr val="accent1"/>
+          </a:lnRef>
+          <a:fillRef idx="0">
+            <a:schemeClr val="accent1"/>
+          </a:fillRef>
+          <a:effectRef idx="0">
+            <a:schemeClr val="accent1"/>
+          </a:effectRef>
+          <a:fontRef idx="minor">
+            <a:schemeClr val="tx1"/>
+          </a:fontRef>
+        </p:style>
+      </p:cxnSp>
+      <p:cxnSp>
+        <p:nvCxnSpPr>
+          <p:cNvPr id="86" name="Straight Arrow Connector 85">
+            <a:extLst>
+              <a:ext uri="{FF2B5EF4-FFF2-40B4-BE49-F238E27FC236}">
+                <a16:creationId xmlns:a16="http://schemas.microsoft.com/office/drawing/2014/main" id="{11159EC1-A270-614F-AD92-A45B6F26005B}"/>
+              </a:ext>
+            </a:extLst>
+          </p:cNvPr>
+          <p:cNvCxnSpPr>
+            <a:cxnSpLocks/>
+          </p:cNvCxnSpPr>
+          <p:nvPr/>
+        </p:nvCxnSpPr>
+        <p:spPr>
+          <a:xfrm>
+            <a:off x="4798544" y="2595533"/>
+            <a:ext cx="0" cy="639752"/>
+          </a:xfrm>
+          <a:prstGeom prst="straightConnector1">
+            <a:avLst/>
+          </a:prstGeom>
+          <a:noFill/>
+          <a:ln w="25400" cap="flat">
+            <a:solidFill>
+              <a:schemeClr val="accent1"/>
+            </a:solidFill>
+            <a:prstDash val="solid"/>
+            <a:round/>
+            <a:tailEnd type="triangle"/>
+          </a:ln>
+          <a:effectLst>
+            <a:outerShdw blurRad="38100" dist="20000" dir="5400000" rotWithShape="0">
+              <a:srgbClr val="000000">
+                <a:alpha val="38000"/>
+              </a:srgbClr>
+            </a:outerShdw>
+          </a:effectLst>
+          <a:sp3d/>
+        </p:spPr>
+        <p:style>
+          <a:lnRef idx="0">
+            <a:scrgbClr r="0" g="0" b="0"/>
+          </a:lnRef>
+          <a:fillRef idx="0">
+            <a:scrgbClr r="0" g="0" b="0"/>
+          </a:fillRef>
+          <a:effectRef idx="0">
+            <a:scrgbClr r="0" g="0" b="0"/>
+          </a:effectRef>
+          <a:fontRef idx="none"/>
+        </p:style>
+      </p:cxnSp>
+      <p:cxnSp>
+        <p:nvCxnSpPr>
+          <p:cNvPr id="87" name="Straight Arrow Connector 86">
+            <a:extLst>
+              <a:ext uri="{FF2B5EF4-FFF2-40B4-BE49-F238E27FC236}">
+                <a16:creationId xmlns:a16="http://schemas.microsoft.com/office/drawing/2014/main" id="{A76E4071-80FE-904E-AD0B-B85016CEA849}"/>
+              </a:ext>
+            </a:extLst>
+          </p:cNvPr>
+          <p:cNvCxnSpPr>
+            <a:cxnSpLocks/>
+          </p:cNvCxnSpPr>
+          <p:nvPr/>
+        </p:nvCxnSpPr>
+        <p:spPr>
+          <a:xfrm flipV="1">
+            <a:off x="4935821" y="2595533"/>
+            <a:ext cx="0" cy="639752"/>
+          </a:xfrm>
+          <a:prstGeom prst="straightConnector1">
+            <a:avLst/>
+          </a:prstGeom>
+          <a:noFill/>
+          <a:ln w="25400" cap="flat">
+            <a:solidFill>
+              <a:schemeClr val="accent1"/>
+            </a:solidFill>
+            <a:prstDash val="solid"/>
+            <a:round/>
+            <a:tailEnd type="triangle"/>
+          </a:ln>
+          <a:effectLst>
+            <a:outerShdw blurRad="38100" dist="20000" dir="5400000" rotWithShape="0">
+              <a:srgbClr val="000000">
+                <a:alpha val="38000"/>
+              </a:srgbClr>
+            </a:outerShdw>
+          </a:effectLst>
+          <a:sp3d/>
+        </p:spPr>
+        <p:style>
+          <a:lnRef idx="0">
+            <a:scrgbClr r="0" g="0" b="0"/>
+          </a:lnRef>
+          <a:fillRef idx="0">
+            <a:scrgbClr r="0" g="0" b="0"/>
+          </a:fillRef>
+          <a:effectRef idx="0">
+            <a:scrgbClr r="0" g="0" b="0"/>
+          </a:effectRef>
+          <a:fontRef idx="none"/>
+        </p:style>
+      </p:cxnSp>
+    </p:spTree>
+    <p:extLst>
+      <p:ext uri="{BB962C8B-B14F-4D97-AF65-F5344CB8AC3E}">
+        <p14:creationId xmlns:p14="http://schemas.microsoft.com/office/powerpoint/2010/main" val="2769458747"/>
       </p:ext>
     </p:extLst>
   </p:cSld>

</xml_diff>